<commit_message>
Final TAC slides, added additional literature
</commit_message>
<xml_diff>
--- a/Vincent Baker TAC Meeting - 10_28_2019.pptx
+++ b/Vincent Baker TAC Meeting - 10_28_2019.pptx
@@ -10,14 +10,15 @@
     <p:sldId id="257" r:id="rId4"/>
     <p:sldId id="277" r:id="rId5"/>
     <p:sldId id="293" r:id="rId6"/>
-    <p:sldId id="291" r:id="rId7"/>
-    <p:sldId id="294" r:id="rId8"/>
-    <p:sldId id="296" r:id="rId9"/>
-    <p:sldId id="297" r:id="rId10"/>
-    <p:sldId id="298" r:id="rId11"/>
-    <p:sldId id="303" r:id="rId12"/>
-    <p:sldId id="299" r:id="rId13"/>
-    <p:sldId id="285" r:id="rId14"/>
+    <p:sldId id="304" r:id="rId7"/>
+    <p:sldId id="291" r:id="rId8"/>
+    <p:sldId id="294" r:id="rId9"/>
+    <p:sldId id="296" r:id="rId10"/>
+    <p:sldId id="297" r:id="rId11"/>
+    <p:sldId id="298" r:id="rId12"/>
+    <p:sldId id="303" r:id="rId13"/>
+    <p:sldId id="299" r:id="rId14"/>
+    <p:sldId id="285" r:id="rId15"/>
   </p:sldIdLst>
   <p:sldSz cx="12192000" cy="6858000"/>
   <p:notesSz cx="6858000" cy="9144000"/>
@@ -448,7 +449,7 @@
           <a:p>
             <a:fld id="{0BC610E4-0AD4-4B2C-A1AF-CEC06808CA2D}" type="datetimeFigureOut">
               <a:rPr lang="en-US" smtClean="0"/>
-              <a:t>10/24/2019</a:t>
+              <a:t>10/25/2019</a:t>
             </a:fld>
             <a:endParaRPr lang="en-US"/>
           </a:p>
@@ -664,7 +665,7 @@
           <a:p>
             <a:fld id="{0BC610E4-0AD4-4B2C-A1AF-CEC06808CA2D}" type="datetimeFigureOut">
               <a:rPr lang="en-US" smtClean="0"/>
-              <a:t>10/24/2019</a:t>
+              <a:t>10/25/2019</a:t>
             </a:fld>
             <a:endParaRPr lang="en-US"/>
           </a:p>
@@ -870,7 +871,7 @@
           <a:p>
             <a:fld id="{0BC610E4-0AD4-4B2C-A1AF-CEC06808CA2D}" type="datetimeFigureOut">
               <a:rPr lang="en-US" smtClean="0"/>
-              <a:t>10/24/2019</a:t>
+              <a:t>10/25/2019</a:t>
             </a:fld>
             <a:endParaRPr lang="en-US"/>
           </a:p>
@@ -1143,7 +1144,7 @@
           <a:p>
             <a:fld id="{0BC610E4-0AD4-4B2C-A1AF-CEC06808CA2D}" type="datetimeFigureOut">
               <a:rPr lang="en-US" smtClean="0"/>
-              <a:t>10/24/2019</a:t>
+              <a:t>10/25/2019</a:t>
             </a:fld>
             <a:endParaRPr lang="en-US"/>
           </a:p>
@@ -1426,7 +1427,7 @@
           <a:p>
             <a:fld id="{0BC610E4-0AD4-4B2C-A1AF-CEC06808CA2D}" type="datetimeFigureOut">
               <a:rPr lang="en-US" smtClean="0"/>
-              <a:t>10/24/2019</a:t>
+              <a:t>10/25/2019</a:t>
             </a:fld>
             <a:endParaRPr lang="en-US"/>
           </a:p>
@@ -1846,7 +1847,7 @@
           <a:p>
             <a:fld id="{0BC610E4-0AD4-4B2C-A1AF-CEC06808CA2D}" type="datetimeFigureOut">
               <a:rPr lang="en-US" smtClean="0"/>
-              <a:t>10/24/2019</a:t>
+              <a:t>10/25/2019</a:t>
             </a:fld>
             <a:endParaRPr lang="en-US"/>
           </a:p>
@@ -1995,7 +1996,7 @@
           <a:p>
             <a:fld id="{0BC610E4-0AD4-4B2C-A1AF-CEC06808CA2D}" type="datetimeFigureOut">
               <a:rPr lang="en-US" smtClean="0"/>
-              <a:t>10/24/2019</a:t>
+              <a:t>10/25/2019</a:t>
             </a:fld>
             <a:endParaRPr lang="en-US"/>
           </a:p>
@@ -2116,7 +2117,7 @@
           <a:p>
             <a:fld id="{0BC610E4-0AD4-4B2C-A1AF-CEC06808CA2D}" type="datetimeFigureOut">
               <a:rPr lang="en-US" smtClean="0"/>
-              <a:t>10/24/2019</a:t>
+              <a:t>10/25/2019</a:t>
             </a:fld>
             <a:endParaRPr lang="en-US"/>
           </a:p>
@@ -2435,7 +2436,7 @@
           <a:p>
             <a:fld id="{0BC610E4-0AD4-4B2C-A1AF-CEC06808CA2D}" type="datetimeFigureOut">
               <a:rPr lang="en-US" smtClean="0"/>
-              <a:t>10/24/2019</a:t>
+              <a:t>10/25/2019</a:t>
             </a:fld>
             <a:endParaRPr lang="en-US"/>
           </a:p>
@@ -2731,7 +2732,7 @@
           <a:p>
             <a:fld id="{0BC610E4-0AD4-4B2C-A1AF-CEC06808CA2D}" type="datetimeFigureOut">
               <a:rPr lang="en-US" smtClean="0"/>
-              <a:t>10/24/2019</a:t>
+              <a:t>10/25/2019</a:t>
             </a:fld>
             <a:endParaRPr lang="en-US"/>
           </a:p>
@@ -3495,7 +3496,7 @@
           <p:cNvPr id="2" name="Title 1">
             <a:extLst>
               <a:ext uri="{FF2B5EF4-FFF2-40B4-BE49-F238E27FC236}">
-                <a16:creationId xmlns:a16="http://schemas.microsoft.com/office/drawing/2014/main" id="{FDDF3642-D1E8-4BA8-9C32-F19D68B19201}"/>
+                <a16:creationId xmlns:a16="http://schemas.microsoft.com/office/drawing/2014/main" id="{8AE2955F-F56C-49B2-9785-47D3209298E4}"/>
               </a:ext>
             </a:extLst>
           </p:cNvPr>
@@ -3513,7 +3514,7 @@
           <a:p>
             <a:r>
               <a:rPr lang="en-US" dirty="0"/>
-              <a:t>Ensembles of columns</a:t>
+              <a:t>Wave velocity</a:t>
             </a:r>
           </a:p>
         </p:txBody>
@@ -3523,7 +3524,7 @@
           <p:cNvPr id="3" name="Content Placeholder 2">
             <a:extLst>
               <a:ext uri="{FF2B5EF4-FFF2-40B4-BE49-F238E27FC236}">
-                <a16:creationId xmlns:a16="http://schemas.microsoft.com/office/drawing/2014/main" id="{C32FD4A7-0707-489D-852D-EC1DA3A15DAA}"/>
+                <a16:creationId xmlns:a16="http://schemas.microsoft.com/office/drawing/2014/main" id="{2A246976-1400-4DAC-8F32-33BCE78E0F4B}"/>
               </a:ext>
             </a:extLst>
           </p:cNvPr>
@@ -3537,7 +3538,7 @@
         <p:spPr>
           <a:xfrm>
             <a:off x="838200" y="1825625"/>
-            <a:ext cx="6107545" cy="4351338"/>
+            <a:ext cx="5765800" cy="4351338"/>
           </a:xfrm>
         </p:spPr>
         <p:txBody>
@@ -3546,26 +3547,25 @@
           <a:p>
             <a:r>
               <a:rPr lang="en-US" dirty="0"/>
-              <a:t>Explore multiple 1-D structures with different levels of connectivity</a:t>
-            </a:r>
-          </a:p>
-          <a:p>
+              <a:t>The wave speed depends on the signal propagation delay parameter </a:t>
+            </a:r>
+            <a:r>
+              <a:rPr lang="el-GR" dirty="0"/>
+              <a:t>κ</a:t>
+            </a:r>
             <a:r>
               <a:rPr lang="en-US" dirty="0"/>
-              <a:t>With high connectivity, ensemble responds like a single large column</a:t>
+              <a:t>, but it’s not linear</a:t>
             </a:r>
           </a:p>
           <a:p>
             <a:r>
               <a:rPr lang="en-US" dirty="0"/>
-              <a:t>With no connectivity columns are independent</a:t>
-            </a:r>
-          </a:p>
-          <a:p>
-            <a:r>
-              <a:rPr lang="en-US" dirty="0"/>
-              <a:t>Weak connectivity: coupling between columns creates interesting dynamics</a:t>
-            </a:r>
+              <a:t>Thicker columns support faster waves</a:t>
+            </a:r>
+          </a:p>
+          <a:p>
+            <a:endParaRPr lang="en-US" dirty="0"/>
           </a:p>
         </p:txBody>
       </p:sp>
@@ -3574,7 +3574,7 @@
           <p:cNvPr id="5" name="Picture 4">
             <a:extLst>
               <a:ext uri="{FF2B5EF4-FFF2-40B4-BE49-F238E27FC236}">
-                <a16:creationId xmlns:a16="http://schemas.microsoft.com/office/drawing/2014/main" id="{5A7F5C8F-F7BE-4E37-92BE-6882E9D267B9}"/>
+                <a16:creationId xmlns:a16="http://schemas.microsoft.com/office/drawing/2014/main" id="{E080B59D-63DD-48F1-90E5-8CC5B54A01C3}"/>
               </a:ext>
             </a:extLst>
           </p:cNvPr>
@@ -3597,8 +3597,8 @@
         </p:blipFill>
         <p:spPr>
           <a:xfrm>
-            <a:off x="6720381" y="1978500"/>
-            <a:ext cx="5417531" cy="4071317"/>
+            <a:off x="7140674" y="2019704"/>
+            <a:ext cx="5051326" cy="3788495"/>
           </a:xfrm>
           <a:prstGeom prst="rect">
             <a:avLst/>
@@ -3608,7 +3608,7 @@
     </p:spTree>
     <p:extLst>
       <p:ext uri="{BB962C8B-B14F-4D97-AF65-F5344CB8AC3E}">
-        <p14:creationId xmlns:p14="http://schemas.microsoft.com/office/powerpoint/2010/main" val="1717226317"/>
+        <p14:creationId xmlns:p14="http://schemas.microsoft.com/office/powerpoint/2010/main" val="3111375987"/>
       </p:ext>
     </p:extLst>
   </p:cSld>
@@ -3640,7 +3640,7 @@
           <p:cNvPr id="2" name="Title 1">
             <a:extLst>
               <a:ext uri="{FF2B5EF4-FFF2-40B4-BE49-F238E27FC236}">
-                <a16:creationId xmlns:a16="http://schemas.microsoft.com/office/drawing/2014/main" id="{1D421535-B171-486D-8EAB-3EF007B65F63}"/>
+                <a16:creationId xmlns:a16="http://schemas.microsoft.com/office/drawing/2014/main" id="{FDDF3642-D1E8-4BA8-9C32-F19D68B19201}"/>
               </a:ext>
             </a:extLst>
           </p:cNvPr>
@@ -3651,19 +3651,14 @@
             <p:ph type="title"/>
           </p:nvPr>
         </p:nvSpPr>
-        <p:spPr>
-          <a:xfrm>
-            <a:off x="838200" y="365125"/>
-            <a:ext cx="8379941" cy="1325563"/>
-          </a:xfrm>
-        </p:spPr>
+        <p:spPr/>
         <p:txBody>
           <a:bodyPr/>
           <a:lstStyle/>
           <a:p>
             <a:r>
               <a:rPr lang="en-US" dirty="0"/>
-              <a:t>Ensemble w/ periodic stimulus</a:t>
+              <a:t>Ensembles of columns</a:t>
             </a:r>
           </a:p>
         </p:txBody>
@@ -3673,7 +3668,7 @@
           <p:cNvPr id="3" name="Content Placeholder 2">
             <a:extLst>
               <a:ext uri="{FF2B5EF4-FFF2-40B4-BE49-F238E27FC236}">
-                <a16:creationId xmlns:a16="http://schemas.microsoft.com/office/drawing/2014/main" id="{1A991B37-D71C-49BB-ACB6-7FD01B2C4F38}"/>
+                <a16:creationId xmlns:a16="http://schemas.microsoft.com/office/drawing/2014/main" id="{C32FD4A7-0707-489D-852D-EC1DA3A15DAA}"/>
               </a:ext>
             </a:extLst>
           </p:cNvPr>
@@ -3684,10 +3679,173 @@
             <p:ph idx="1"/>
           </p:nvPr>
         </p:nvSpPr>
-        <p:spPr/>
+        <p:spPr>
+          <a:xfrm>
+            <a:off x="838200" y="1825625"/>
+            <a:ext cx="6107545" cy="4351338"/>
+          </a:xfrm>
+        </p:spPr>
         <p:txBody>
           <a:bodyPr/>
           <a:lstStyle/>
+          <a:p>
+            <a:r>
+              <a:rPr lang="en-US" dirty="0"/>
+              <a:t>Explore multiple 1-D structures with different levels of connectivity</a:t>
+            </a:r>
+          </a:p>
+          <a:p>
+            <a:r>
+              <a:rPr lang="en-US" dirty="0"/>
+              <a:t>With high connectivity, ensemble responds like a single large column</a:t>
+            </a:r>
+          </a:p>
+          <a:p>
+            <a:r>
+              <a:rPr lang="en-US" dirty="0"/>
+              <a:t>With no connectivity columns are independent</a:t>
+            </a:r>
+          </a:p>
+          <a:p>
+            <a:r>
+              <a:rPr lang="en-US" dirty="0"/>
+              <a:t>Weak connectivity: coupling between columns creates interesting dynamics</a:t>
+            </a:r>
+          </a:p>
+        </p:txBody>
+      </p:sp>
+      <p:pic>
+        <p:nvPicPr>
+          <p:cNvPr id="5" name="Picture 4">
+            <a:extLst>
+              <a:ext uri="{FF2B5EF4-FFF2-40B4-BE49-F238E27FC236}">
+                <a16:creationId xmlns:a16="http://schemas.microsoft.com/office/drawing/2014/main" id="{5A7F5C8F-F7BE-4E37-92BE-6882E9D267B9}"/>
+              </a:ext>
+            </a:extLst>
+          </p:cNvPr>
+          <p:cNvPicPr>
+            <a:picLocks noChangeAspect="1"/>
+          </p:cNvPicPr>
+          <p:nvPr/>
+        </p:nvPicPr>
+        <p:blipFill>
+          <a:blip r:embed="rId2">
+            <a:extLst>
+              <a:ext uri="{28A0092B-C50C-407E-A947-70E740481C1C}">
+                <a14:useLocalDpi xmlns:a14="http://schemas.microsoft.com/office/drawing/2010/main" val="0"/>
+              </a:ext>
+            </a:extLst>
+          </a:blip>
+          <a:stretch>
+            <a:fillRect/>
+          </a:stretch>
+        </p:blipFill>
+        <p:spPr>
+          <a:xfrm>
+            <a:off x="6720381" y="1978500"/>
+            <a:ext cx="5417531" cy="4071317"/>
+          </a:xfrm>
+          <a:prstGeom prst="rect">
+            <a:avLst/>
+          </a:prstGeom>
+        </p:spPr>
+      </p:pic>
+    </p:spTree>
+    <p:extLst>
+      <p:ext uri="{BB962C8B-B14F-4D97-AF65-F5344CB8AC3E}">
+        <p14:creationId xmlns:p14="http://schemas.microsoft.com/office/powerpoint/2010/main" val="1717226317"/>
+      </p:ext>
+    </p:extLst>
+  </p:cSld>
+  <p:clrMapOvr>
+    <a:masterClrMapping/>
+  </p:clrMapOvr>
+</p:sld>
+</file>
+
+<file path=ppt/slides/slide12.xml><?xml version="1.0" encoding="utf-8"?>
+<p:sld xmlns:a="http://schemas.openxmlformats.org/drawingml/2006/main" xmlns:r="http://schemas.openxmlformats.org/officeDocument/2006/relationships" xmlns:p="http://schemas.openxmlformats.org/presentationml/2006/main">
+  <p:cSld>
+    <p:spTree>
+      <p:nvGrpSpPr>
+        <p:cNvPr id="1" name=""/>
+        <p:cNvGrpSpPr/>
+        <p:nvPr/>
+      </p:nvGrpSpPr>
+      <p:grpSpPr>
+        <a:xfrm>
+          <a:off x="0" y="0"/>
+          <a:ext cx="0" cy="0"/>
+          <a:chOff x="0" y="0"/>
+          <a:chExt cx="0" cy="0"/>
+        </a:xfrm>
+      </p:grpSpPr>
+      <p:sp>
+        <p:nvSpPr>
+          <p:cNvPr id="2" name="Title 1">
+            <a:extLst>
+              <a:ext uri="{FF2B5EF4-FFF2-40B4-BE49-F238E27FC236}">
+                <a16:creationId xmlns:a16="http://schemas.microsoft.com/office/drawing/2014/main" id="{1D421535-B171-486D-8EAB-3EF007B65F63}"/>
+              </a:ext>
+            </a:extLst>
+          </p:cNvPr>
+          <p:cNvSpPr>
+            <a:spLocks noGrp="1"/>
+          </p:cNvSpPr>
+          <p:nvPr>
+            <p:ph type="title"/>
+          </p:nvPr>
+        </p:nvSpPr>
+        <p:spPr>
+          <a:xfrm>
+            <a:off x="838200" y="365125"/>
+            <a:ext cx="8379941" cy="1325563"/>
+          </a:xfrm>
+        </p:spPr>
+        <p:txBody>
+          <a:bodyPr/>
+          <a:lstStyle/>
+          <a:p>
+            <a:r>
+              <a:rPr lang="en-US" dirty="0"/>
+              <a:t>Ensemble w/ periodic stimulus</a:t>
+            </a:r>
+          </a:p>
+        </p:txBody>
+      </p:sp>
+      <p:sp>
+        <p:nvSpPr>
+          <p:cNvPr id="3" name="Content Placeholder 2">
+            <a:extLst>
+              <a:ext uri="{FF2B5EF4-FFF2-40B4-BE49-F238E27FC236}">
+                <a16:creationId xmlns:a16="http://schemas.microsoft.com/office/drawing/2014/main" id="{1A991B37-D71C-49BB-ACB6-7FD01B2C4F38}"/>
+              </a:ext>
+            </a:extLst>
+          </p:cNvPr>
+          <p:cNvSpPr>
+            <a:spLocks noGrp="1"/>
+          </p:cNvSpPr>
+          <p:nvPr>
+            <p:ph idx="1"/>
+          </p:nvPr>
+        </p:nvSpPr>
+        <p:spPr>
+          <a:xfrm>
+            <a:off x="838200" y="1825625"/>
+            <a:ext cx="10515600" cy="1177232"/>
+          </a:xfrm>
+        </p:spPr>
+        <p:txBody>
+          <a:bodyPr>
+            <a:normAutofit fontScale="77500" lnSpcReduction="20000"/>
+          </a:bodyPr>
+          <a:lstStyle/>
+          <a:p>
+            <a:r>
+              <a:rPr lang="en-US" dirty="0"/>
+              <a:t>Ensemble with spacing =5</a:t>
+            </a:r>
+          </a:p>
           <a:p>
             <a:r>
               <a:rPr lang="en-US" dirty="0"/>
@@ -3724,7 +3882,7 @@
               </a:ext>
             </a:extLst>
           </a:blip>
-          <a:srcRect l="10724" r="28675"/>
+          <a:srcRect/>
           <a:stretch/>
         </p:blipFill>
         <p:spPr>
@@ -3908,116 +4066,6 @@
 </p:sld>
 </file>
 
-<file path=ppt/slides/slide12.xml><?xml version="1.0" encoding="utf-8"?>
-<p:sld xmlns:a="http://schemas.openxmlformats.org/drawingml/2006/main" xmlns:r="http://schemas.openxmlformats.org/officeDocument/2006/relationships" xmlns:p="http://schemas.openxmlformats.org/presentationml/2006/main">
-  <p:cSld>
-    <p:spTree>
-      <p:nvGrpSpPr>
-        <p:cNvPr id="1" name=""/>
-        <p:cNvGrpSpPr/>
-        <p:nvPr/>
-      </p:nvGrpSpPr>
-      <p:grpSpPr>
-        <a:xfrm>
-          <a:off x="0" y="0"/>
-          <a:ext cx="0" cy="0"/>
-          <a:chOff x="0" y="0"/>
-          <a:chExt cx="0" cy="0"/>
-        </a:xfrm>
-      </p:grpSpPr>
-      <p:sp>
-        <p:nvSpPr>
-          <p:cNvPr id="2" name="Title 1">
-            <a:extLst>
-              <a:ext uri="{FF2B5EF4-FFF2-40B4-BE49-F238E27FC236}">
-                <a16:creationId xmlns:a16="http://schemas.microsoft.com/office/drawing/2014/main" id="{2F22342D-00D5-4058-AB8A-574FC720C0D0}"/>
-              </a:ext>
-            </a:extLst>
-          </p:cNvPr>
-          <p:cNvSpPr>
-            <a:spLocks noGrp="1"/>
-          </p:cNvSpPr>
-          <p:nvPr>
-            <p:ph type="title"/>
-          </p:nvPr>
-        </p:nvSpPr>
-        <p:spPr/>
-        <p:txBody>
-          <a:bodyPr/>
-          <a:lstStyle/>
-          <a:p>
-            <a:r>
-              <a:rPr lang="en-US" dirty="0"/>
-              <a:t>Next steps</a:t>
-            </a:r>
-          </a:p>
-        </p:txBody>
-      </p:sp>
-      <p:sp>
-        <p:nvSpPr>
-          <p:cNvPr id="3" name="Content Placeholder 2">
-            <a:extLst>
-              <a:ext uri="{FF2B5EF4-FFF2-40B4-BE49-F238E27FC236}">
-                <a16:creationId xmlns:a16="http://schemas.microsoft.com/office/drawing/2014/main" id="{A91532DD-1C83-4D2E-AEF8-2BBB59FD380E}"/>
-              </a:ext>
-            </a:extLst>
-          </p:cNvPr>
-          <p:cNvSpPr>
-            <a:spLocks noGrp="1"/>
-          </p:cNvSpPr>
-          <p:nvPr>
-            <p:ph idx="1"/>
-          </p:nvPr>
-        </p:nvSpPr>
-        <p:spPr/>
-        <p:txBody>
-          <a:bodyPr/>
-          <a:lstStyle/>
-          <a:p>
-            <a:r>
-              <a:rPr lang="en-US" dirty="0"/>
-              <a:t>Characterize column ensembles as coupled oscillators</a:t>
-            </a:r>
-          </a:p>
-          <a:p>
-            <a:pPr marL="0" indent="0">
-              <a:buNone/>
-            </a:pPr>
-            <a:endParaRPr lang="en-US" dirty="0"/>
-          </a:p>
-          <a:p>
-            <a:r>
-              <a:rPr lang="en-US" dirty="0"/>
-              <a:t>Train a classifier based on ensemble of columns, measure classification performance as a function of column parameters (paper #2)</a:t>
-            </a:r>
-          </a:p>
-          <a:p>
-            <a:pPr marL="0" indent="0">
-              <a:buNone/>
-            </a:pPr>
-            <a:endParaRPr lang="en-US" dirty="0"/>
-          </a:p>
-          <a:p>
-            <a:r>
-              <a:rPr lang="en-US" dirty="0"/>
-              <a:t>Develop thesis from papers 1 and 2</a:t>
-            </a:r>
-          </a:p>
-        </p:txBody>
-      </p:sp>
-    </p:spTree>
-    <p:extLst>
-      <p:ext uri="{BB962C8B-B14F-4D97-AF65-F5344CB8AC3E}">
-        <p14:creationId xmlns:p14="http://schemas.microsoft.com/office/powerpoint/2010/main" val="3251436776"/>
-      </p:ext>
-    </p:extLst>
-  </p:cSld>
-  <p:clrMapOvr>
-    <a:masterClrMapping/>
-  </p:clrMapOvr>
-</p:sld>
-</file>
-
 <file path=ppt/slides/slide13.xml><?xml version="1.0" encoding="utf-8"?>
 <p:sld xmlns:a="http://schemas.openxmlformats.org/drawingml/2006/main" xmlns:r="http://schemas.openxmlformats.org/officeDocument/2006/relationships" xmlns:p="http://schemas.openxmlformats.org/presentationml/2006/main">
   <p:cSld>
@@ -4037,6 +4085,140 @@
       </p:grpSpPr>
       <p:sp>
         <p:nvSpPr>
+          <p:cNvPr id="2" name="Title 1">
+            <a:extLst>
+              <a:ext uri="{FF2B5EF4-FFF2-40B4-BE49-F238E27FC236}">
+                <a16:creationId xmlns:a16="http://schemas.microsoft.com/office/drawing/2014/main" id="{2F22342D-00D5-4058-AB8A-574FC720C0D0}"/>
+              </a:ext>
+            </a:extLst>
+          </p:cNvPr>
+          <p:cNvSpPr>
+            <a:spLocks noGrp="1"/>
+          </p:cNvSpPr>
+          <p:nvPr>
+            <p:ph type="title"/>
+          </p:nvPr>
+        </p:nvSpPr>
+        <p:spPr/>
+        <p:txBody>
+          <a:bodyPr/>
+          <a:lstStyle/>
+          <a:p>
+            <a:r>
+              <a:rPr lang="en-US" dirty="0"/>
+              <a:t>Summary</a:t>
+            </a:r>
+          </a:p>
+        </p:txBody>
+      </p:sp>
+      <p:sp>
+        <p:nvSpPr>
+          <p:cNvPr id="3" name="Content Placeholder 2">
+            <a:extLst>
+              <a:ext uri="{FF2B5EF4-FFF2-40B4-BE49-F238E27FC236}">
+                <a16:creationId xmlns:a16="http://schemas.microsoft.com/office/drawing/2014/main" id="{A91532DD-1C83-4D2E-AEF8-2BBB59FD380E}"/>
+              </a:ext>
+            </a:extLst>
+          </p:cNvPr>
+          <p:cNvSpPr>
+            <a:spLocks noGrp="1"/>
+          </p:cNvSpPr>
+          <p:nvPr>
+            <p:ph idx="1"/>
+          </p:nvPr>
+        </p:nvSpPr>
+        <p:spPr/>
+        <p:txBody>
+          <a:bodyPr/>
+          <a:lstStyle/>
+          <a:p>
+            <a:r>
+              <a:rPr lang="en-US" dirty="0"/>
+              <a:t>Progress to date:</a:t>
+            </a:r>
+          </a:p>
+          <a:p>
+            <a:pPr lvl="1"/>
+            <a:r>
+              <a:rPr lang="en-US" dirty="0"/>
+              <a:t>Developed optimized simulation of neural column structures</a:t>
+            </a:r>
+          </a:p>
+          <a:p>
+            <a:pPr lvl="1"/>
+            <a:r>
+              <a:rPr lang="en-US" dirty="0"/>
+              <a:t>Characterized traveling waves in single columns and ensembles of columns</a:t>
+            </a:r>
+          </a:p>
+          <a:p>
+            <a:pPr lvl="1"/>
+            <a:r>
+              <a:rPr lang="en-US" dirty="0"/>
+              <a:t>Draft paper on traveling wave dynamics</a:t>
+            </a:r>
+          </a:p>
+          <a:p>
+            <a:r>
+              <a:rPr lang="en-US" dirty="0"/>
+              <a:t>Next steps:</a:t>
+            </a:r>
+          </a:p>
+          <a:p>
+            <a:pPr lvl="1"/>
+            <a:r>
+              <a:rPr lang="en-US" dirty="0"/>
+              <a:t>Characterize column ensembles more thoroughly</a:t>
+            </a:r>
+          </a:p>
+          <a:p>
+            <a:pPr lvl="1"/>
+            <a:r>
+              <a:rPr lang="en-US" dirty="0"/>
+              <a:t>Train a classifier based on ensemble of columns, measure classification performance as a function of column parameters (paper #2)</a:t>
+            </a:r>
+          </a:p>
+          <a:p>
+            <a:pPr lvl="1"/>
+            <a:r>
+              <a:rPr lang="en-US" dirty="0"/>
+              <a:t>Develop thesis from papers 1 and 2</a:t>
+            </a:r>
+          </a:p>
+        </p:txBody>
+      </p:sp>
+    </p:spTree>
+    <p:extLst>
+      <p:ext uri="{BB962C8B-B14F-4D97-AF65-F5344CB8AC3E}">
+        <p14:creationId xmlns:p14="http://schemas.microsoft.com/office/powerpoint/2010/main" val="3251436776"/>
+      </p:ext>
+    </p:extLst>
+  </p:cSld>
+  <p:clrMapOvr>
+    <a:masterClrMapping/>
+  </p:clrMapOvr>
+</p:sld>
+</file>
+
+<file path=ppt/slides/slide14.xml><?xml version="1.0" encoding="utf-8"?>
+<p:sld xmlns:a="http://schemas.openxmlformats.org/drawingml/2006/main" xmlns:r="http://schemas.openxmlformats.org/officeDocument/2006/relationships" xmlns:p="http://schemas.openxmlformats.org/presentationml/2006/main">
+  <p:cSld>
+    <p:spTree>
+      <p:nvGrpSpPr>
+        <p:cNvPr id="1" name=""/>
+        <p:cNvGrpSpPr/>
+        <p:nvPr/>
+      </p:nvGrpSpPr>
+      <p:grpSpPr>
+        <a:xfrm>
+          <a:off x="0" y="0"/>
+          <a:ext cx="0" cy="0"/>
+          <a:chOff x="0" y="0"/>
+          <a:chExt cx="0" cy="0"/>
+        </a:xfrm>
+      </p:grpSpPr>
+      <p:sp>
+        <p:nvSpPr>
           <p:cNvPr id="2" name="Title 1"/>
           <p:cNvSpPr>
             <a:spLocks noGrp="1"/>
@@ -4141,15 +4323,15 @@
           <a:p>
             <a:r>
               <a:rPr lang="en-US" sz="1600" dirty="0"/>
-              <a:t>[6] Thomas </a:t>
+              <a:t>[6] Doron </a:t>
             </a:r>
             <a:r>
               <a:rPr lang="en-US" sz="1600" dirty="0" err="1"/>
-              <a:t>Kreuz</a:t>
+              <a:t>Shoham</a:t>
             </a:r>
             <a:r>
               <a:rPr lang="en-US" sz="1600" dirty="0"/>
-              <a:t> et al. “Monitoring spike train synchrony". In: Journal of Neurophysiology 109 (2012).</a:t>
+              <a:t> et al, "Imaging Cortical Dynamics at High Spatial and Temporal Resolution with Novel Blue Voltage Sensitive Dyes", Neuron vol 24 1999</a:t>
             </a:r>
           </a:p>
           <a:p>
@@ -4163,13 +4345,7 @@
             </a:r>
             <a:r>
               <a:rPr lang="en-US" sz="1600" dirty="0"/>
-              <a:t>. “Real-time Computing Without Stable States: A New Framework for Neural Computation Based on Perturbations". </a:t>
-            </a:r>
-          </a:p>
-          <a:p>
-            <a:r>
-              <a:rPr lang="en-US" sz="1600" dirty="0"/>
-              <a:t>In: Neural Computation 14 (2002).</a:t>
+              <a:t>. “Real-time Computing Without Stable States: A New Framework for Neural Computation Based on Perturbations“, Neural Computation 14 (2002).</a:t>
             </a:r>
           </a:p>
           <a:p>
@@ -4191,13 +4367,7 @@
             </a:r>
             <a:r>
               <a:rPr lang="en-US" sz="1600" dirty="0"/>
-              <a:t>. “Differential signaling via the same axon of neocortical pyramidal neurons". </a:t>
-            </a:r>
-          </a:p>
-          <a:p>
-            <a:r>
-              <a:rPr lang="en-US" sz="1600" dirty="0"/>
-              <a:t>In: Proceedings of the National Academy of Sciences, 95 (1998).</a:t>
+              <a:t>. “Differential signaling via the same axon of neocortical pyramidal neurons“, Proceedings of the National Academy of Sciences, 95 (1998).</a:t>
             </a:r>
           </a:p>
           <a:p>
@@ -6371,7 +6541,7 @@
           <a:p>
             <a:r>
               <a:rPr lang="en-US" dirty="0"/>
-              <a:t>Research question: What are the dynamics of traveling waves in “1-D” neural structures and what are there possible cognitive functions?</a:t>
+              <a:t>Research question: What are the dynamics of traveling waves in “1-D” neural structures and what are their possible cognitive functions?</a:t>
             </a:r>
           </a:p>
           <a:p>
@@ -6404,7 +6574,7 @@
             <a:pPr lvl="1"/>
             <a:r>
               <a:rPr lang="en-US" dirty="0"/>
-              <a:t>Place these simulated neural structures in a framework </a:t>
+              <a:t>Place these simulated neural structures in a framework (to be done)</a:t>
             </a:r>
           </a:p>
         </p:txBody>
@@ -6471,7 +6641,12 @@
             <p:ph idx="1"/>
           </p:nvPr>
         </p:nvSpPr>
-        <p:spPr/>
+        <p:spPr>
+          <a:xfrm>
+            <a:off x="838201" y="1825625"/>
+            <a:ext cx="7415700" cy="4351338"/>
+          </a:xfrm>
+        </p:spPr>
         <p:txBody>
           <a:bodyPr>
             <a:normAutofit lnSpcReduction="10000"/>
@@ -6480,7 +6655,7 @@
           <a:p>
             <a:r>
               <a:rPr lang="en-US" dirty="0"/>
-              <a:t>As brain imaging spatial and temporal resolution has improved, mesoscale traveling waves have been observed</a:t>
+              <a:t>Traveling waves have been recently been observed in the cortex</a:t>
             </a:r>
           </a:p>
           <a:p>
@@ -6525,6 +6700,239 @@
             <a:r>
               <a:rPr lang="en-US" dirty="0"/>
               <a:t>Examination of traveling wave computational role using the Liquid State Machine artificial intelligence framework</a:t>
+            </a:r>
+          </a:p>
+        </p:txBody>
+      </p:sp>
+      <p:pic>
+        <p:nvPicPr>
+          <p:cNvPr id="5" name="Picture 4">
+            <a:extLst>
+              <a:ext uri="{FF2B5EF4-FFF2-40B4-BE49-F238E27FC236}">
+                <a16:creationId xmlns:a16="http://schemas.microsoft.com/office/drawing/2014/main" id="{A5BB7686-2228-4DFA-91FA-C12D3EB407D6}"/>
+              </a:ext>
+            </a:extLst>
+          </p:cNvPr>
+          <p:cNvPicPr>
+            <a:picLocks noChangeAspect="1"/>
+          </p:cNvPicPr>
+          <p:nvPr/>
+        </p:nvPicPr>
+        <p:blipFill>
+          <a:blip r:embed="rId2">
+            <a:extLst>
+              <a:ext uri="{28A0092B-C50C-407E-A947-70E740481C1C}">
+                <a14:useLocalDpi xmlns:a14="http://schemas.microsoft.com/office/drawing/2010/main" val="0"/>
+              </a:ext>
+            </a:extLst>
+          </a:blip>
+          <a:stretch>
+            <a:fillRect/>
+          </a:stretch>
+        </p:blipFill>
+        <p:spPr>
+          <a:xfrm>
+            <a:off x="8743878" y="1912476"/>
+            <a:ext cx="2197767" cy="1718876"/>
+          </a:xfrm>
+          <a:prstGeom prst="rect">
+            <a:avLst/>
+          </a:prstGeom>
+        </p:spPr>
+      </p:pic>
+      <p:pic>
+        <p:nvPicPr>
+          <p:cNvPr id="6" name="Picture 5">
+            <a:extLst>
+              <a:ext uri="{FF2B5EF4-FFF2-40B4-BE49-F238E27FC236}">
+                <a16:creationId xmlns:a16="http://schemas.microsoft.com/office/drawing/2014/main" id="{E4BBE576-CED5-4A0B-9B45-188E3EED669A}"/>
+              </a:ext>
+            </a:extLst>
+          </p:cNvPr>
+          <p:cNvPicPr>
+            <a:picLocks noChangeAspect="1"/>
+          </p:cNvPicPr>
+          <p:nvPr/>
+        </p:nvPicPr>
+        <p:blipFill rotWithShape="1">
+          <a:blip r:embed="rId3">
+            <a:extLst>
+              <a:ext uri="{28A0092B-C50C-407E-A947-70E740481C1C}">
+                <a14:useLocalDpi xmlns:a14="http://schemas.microsoft.com/office/drawing/2010/main" val="0"/>
+              </a:ext>
+            </a:extLst>
+          </a:blip>
+          <a:srcRect l="29413" t="78303" r="34919" b="6074"/>
+          <a:stretch/>
+        </p:blipFill>
+        <p:spPr>
+          <a:xfrm>
+            <a:off x="8494570" y="4169840"/>
+            <a:ext cx="3058297" cy="1556951"/>
+          </a:xfrm>
+          <a:prstGeom prst="rect">
+            <a:avLst/>
+          </a:prstGeom>
+        </p:spPr>
+      </p:pic>
+      <p:sp>
+        <p:nvSpPr>
+          <p:cNvPr id="7" name="Rectangle 6">
+            <a:extLst>
+              <a:ext uri="{FF2B5EF4-FFF2-40B4-BE49-F238E27FC236}">
+                <a16:creationId xmlns:a16="http://schemas.microsoft.com/office/drawing/2014/main" id="{E099EE16-7B1A-4A2D-9B54-E22154EDADA6}"/>
+              </a:ext>
+            </a:extLst>
+          </p:cNvPr>
+          <p:cNvSpPr/>
+          <p:nvPr/>
+        </p:nvSpPr>
+        <p:spPr>
+          <a:xfrm>
+            <a:off x="8982321" y="5466945"/>
+            <a:ext cx="416273" cy="94210"/>
+          </a:xfrm>
+          <a:prstGeom prst="rect">
+            <a:avLst/>
+          </a:prstGeom>
+          <a:solidFill>
+            <a:schemeClr val="bg1"/>
+          </a:solidFill>
+        </p:spPr>
+        <p:style>
+          <a:lnRef idx="2">
+            <a:schemeClr val="accent1">
+              <a:shade val="50000"/>
+            </a:schemeClr>
+          </a:lnRef>
+          <a:fillRef idx="1">
+            <a:schemeClr val="accent1"/>
+          </a:fillRef>
+          <a:effectRef idx="0">
+            <a:schemeClr val="accent1"/>
+          </a:effectRef>
+          <a:fontRef idx="minor">
+            <a:schemeClr val="lt1"/>
+          </a:fontRef>
+        </p:style>
+        <p:txBody>
+          <a:bodyPr rtlCol="0" anchor="ctr"/>
+          <a:lstStyle/>
+          <a:p>
+            <a:pPr algn="ctr"/>
+            <a:endParaRPr lang="en-US"/>
+          </a:p>
+        </p:txBody>
+      </p:sp>
+      <p:sp>
+        <p:nvSpPr>
+          <p:cNvPr id="8" name="TextBox 7">
+            <a:extLst>
+              <a:ext uri="{FF2B5EF4-FFF2-40B4-BE49-F238E27FC236}">
+                <a16:creationId xmlns:a16="http://schemas.microsoft.com/office/drawing/2014/main" id="{47393D69-0B24-4C69-8B41-C10E239ACF70}"/>
+              </a:ext>
+            </a:extLst>
+          </p:cNvPr>
+          <p:cNvSpPr txBox="1"/>
+          <p:nvPr/>
+        </p:nvSpPr>
+        <p:spPr>
+          <a:xfrm>
+            <a:off x="8917786" y="5587682"/>
+            <a:ext cx="545342" cy="276999"/>
+          </a:xfrm>
+          <a:prstGeom prst="rect">
+            <a:avLst/>
+          </a:prstGeom>
+          <a:noFill/>
+        </p:spPr>
+        <p:txBody>
+          <a:bodyPr wrap="none" rtlCol="0">
+            <a:spAutoFit/>
+          </a:bodyPr>
+          <a:lstStyle/>
+          <a:p>
+            <a:r>
+              <a:rPr lang="en-US" sz="1200" dirty="0"/>
+              <a:t>1 mm</a:t>
+            </a:r>
+          </a:p>
+        </p:txBody>
+      </p:sp>
+      <p:sp>
+        <p:nvSpPr>
+          <p:cNvPr id="9" name="TextBox 8">
+            <a:extLst>
+              <a:ext uri="{FF2B5EF4-FFF2-40B4-BE49-F238E27FC236}">
+                <a16:creationId xmlns:a16="http://schemas.microsoft.com/office/drawing/2014/main" id="{4F296391-13E7-4ED3-B7FF-C6D2E9BE3BD1}"/>
+              </a:ext>
+            </a:extLst>
+          </p:cNvPr>
+          <p:cNvSpPr txBox="1"/>
+          <p:nvPr/>
+        </p:nvSpPr>
+        <p:spPr>
+          <a:xfrm>
+            <a:off x="8523754" y="5809976"/>
+            <a:ext cx="2750604" cy="523220"/>
+          </a:xfrm>
+          <a:prstGeom prst="rect">
+            <a:avLst/>
+          </a:prstGeom>
+          <a:noFill/>
+        </p:spPr>
+        <p:txBody>
+          <a:bodyPr wrap="square" rtlCol="0">
+            <a:spAutoFit/>
+          </a:bodyPr>
+          <a:lstStyle/>
+          <a:p>
+            <a:r>
+              <a:rPr lang="en-US" sz="1400" i="1" dirty="0"/>
+              <a:t>Cortical activation under advanced imaging, 9.6 </a:t>
+            </a:r>
+            <a:r>
+              <a:rPr lang="en-US" sz="1400" i="1" dirty="0" err="1"/>
+              <a:t>ms</a:t>
+            </a:r>
+            <a:r>
+              <a:rPr lang="en-US" sz="1400" i="1" dirty="0"/>
+              <a:t>/frame [6]</a:t>
+            </a:r>
+          </a:p>
+        </p:txBody>
+      </p:sp>
+      <p:sp>
+        <p:nvSpPr>
+          <p:cNvPr id="10" name="TextBox 9">
+            <a:extLst>
+              <a:ext uri="{FF2B5EF4-FFF2-40B4-BE49-F238E27FC236}">
+                <a16:creationId xmlns:a16="http://schemas.microsoft.com/office/drawing/2014/main" id="{ACD0EE69-C62E-4AFF-BFAB-17D7A04C43C7}"/>
+              </a:ext>
+            </a:extLst>
+          </p:cNvPr>
+          <p:cNvSpPr txBox="1"/>
+          <p:nvPr/>
+        </p:nvSpPr>
+        <p:spPr>
+          <a:xfrm>
+            <a:off x="8844766" y="3571673"/>
+            <a:ext cx="2586856" cy="307777"/>
+          </a:xfrm>
+          <a:prstGeom prst="rect">
+            <a:avLst/>
+          </a:prstGeom>
+          <a:noFill/>
+        </p:spPr>
+        <p:txBody>
+          <a:bodyPr wrap="square" rtlCol="0">
+            <a:spAutoFit/>
+          </a:bodyPr>
+          <a:lstStyle/>
+          <a:p>
+            <a:r>
+              <a:rPr lang="en-US" sz="1400" i="1" dirty="0"/>
+              <a:t>Human visual cortex areas</a:t>
             </a:r>
           </a:p>
         </p:txBody>
@@ -6575,14 +6983,19 @@
             <p:ph type="title"/>
           </p:nvPr>
         </p:nvSpPr>
-        <p:spPr/>
+        <p:spPr>
+          <a:xfrm>
+            <a:off x="838200" y="365125"/>
+            <a:ext cx="8218251" cy="1325563"/>
+          </a:xfrm>
+        </p:spPr>
         <p:txBody>
           <a:bodyPr/>
           <a:lstStyle/>
           <a:p>
             <a:r>
               <a:rPr lang="en-US" dirty="0"/>
-              <a:t>Column Structure</a:t>
+              <a:t>Column Topology and Connectivity</a:t>
             </a:r>
           </a:p>
         </p:txBody>
@@ -6605,12 +7018,14 @@
         </p:nvSpPr>
         <p:spPr>
           <a:xfrm>
-            <a:off x="838200" y="1825625"/>
-            <a:ext cx="6428362" cy="4351338"/>
-          </a:xfrm>
-        </p:spPr>
-        <p:txBody>
-          <a:bodyPr/>
+            <a:off x="838199" y="1825625"/>
+            <a:ext cx="7926421" cy="4667250"/>
+          </a:xfrm>
+        </p:spPr>
+        <p:txBody>
+          <a:bodyPr>
+            <a:normAutofit/>
+          </a:bodyPr>
           <a:lstStyle/>
           <a:p>
             <a:r>
@@ -6619,15 +7034,39 @@
             </a:r>
           </a:p>
           <a:p>
+            <a:pPr lvl="1"/>
+            <a:r>
+              <a:rPr lang="en-US" dirty="0"/>
+              <a:t>Most work done with 2x2x100 dimension columns</a:t>
+            </a:r>
+          </a:p>
+          <a:p>
             <a:r>
               <a:rPr lang="en-US" dirty="0"/>
               <a:t>Connectivity: Long vs. short range, connection density</a:t>
             </a:r>
           </a:p>
           <a:p>
+            <a:pPr lvl="1"/>
             <a:r>
               <a:rPr lang="en-US" dirty="0"/>
-              <a:t>Neuron/synapse dynamics: dynamic system with two dimensions (Izhikevich model)</a:t>
+              <a:t>Connection probability: </a:t>
+            </a:r>
+          </a:p>
+          <a:p>
+            <a:endParaRPr lang="en-US" dirty="0"/>
+          </a:p>
+          <a:p>
+            <a:endParaRPr lang="en-US" dirty="0"/>
+          </a:p>
+          <a:p>
+            <a:endParaRPr lang="en-US" dirty="0"/>
+          </a:p>
+          <a:p>
+            <a:pPr lvl="1"/>
+            <a:r>
+              <a:rPr lang="en-US" dirty="0"/>
+              <a:t>Typically C=1, lambda=2.5 in our experiments</a:t>
             </a:r>
           </a:p>
         </p:txBody>
@@ -6647,14 +7086,90 @@
           <p:nvPr/>
         </p:nvPicPr>
         <p:blipFill rotWithShape="1">
-          <a:blip r:embed="rId2"/>
-          <a:srcRect l="16565" r="55137"/>
+          <a:blip r:embed="rId2">
+            <a:extLst>
+              <a:ext uri="{28A0092B-C50C-407E-A947-70E740481C1C}">
+                <a14:useLocalDpi xmlns:a14="http://schemas.microsoft.com/office/drawing/2010/main" val="0"/>
+              </a:ext>
+            </a:extLst>
+          </a:blip>
+          <a:srcRect/>
           <a:stretch/>
         </p:blipFill>
         <p:spPr>
           <a:xfrm>
-            <a:off x="8385244" y="1825625"/>
-            <a:ext cx="2071992" cy="4352921"/>
+            <a:off x="9427723" y="2023353"/>
+            <a:ext cx="1724999" cy="3385125"/>
+          </a:xfrm>
+          <a:prstGeom prst="rect">
+            <a:avLst/>
+          </a:prstGeom>
+        </p:spPr>
+      </p:pic>
+      <p:sp>
+        <p:nvSpPr>
+          <p:cNvPr id="5" name="TextBox 4">
+            <a:extLst>
+              <a:ext uri="{FF2B5EF4-FFF2-40B4-BE49-F238E27FC236}">
+                <a16:creationId xmlns:a16="http://schemas.microsoft.com/office/drawing/2014/main" id="{B46AA801-03FC-4C04-B69F-D9C1069A5005}"/>
+              </a:ext>
+            </a:extLst>
+          </p:cNvPr>
+          <p:cNvSpPr txBox="1"/>
+          <p:nvPr/>
+        </p:nvSpPr>
+        <p:spPr>
+          <a:xfrm>
+            <a:off x="8855742" y="5408478"/>
+            <a:ext cx="2868959" cy="1384995"/>
+          </a:xfrm>
+          <a:prstGeom prst="rect">
+            <a:avLst/>
+          </a:prstGeom>
+          <a:noFill/>
+        </p:spPr>
+        <p:txBody>
+          <a:bodyPr wrap="square" rtlCol="0">
+            <a:spAutoFit/>
+          </a:bodyPr>
+          <a:lstStyle/>
+          <a:p>
+            <a:r>
+              <a:rPr lang="en-US" sz="1400" i="1" dirty="0"/>
+              <a:t>An example column of dimension 3x3x15. Neuron connections are color-coded according to their length. The neuron connectivity is mostly local, with some long-range connections.</a:t>
+            </a:r>
+          </a:p>
+        </p:txBody>
+      </p:sp>
+      <p:pic>
+        <p:nvPicPr>
+          <p:cNvPr id="3" name="Picture 2">
+            <a:extLst>
+              <a:ext uri="{FF2B5EF4-FFF2-40B4-BE49-F238E27FC236}">
+                <a16:creationId xmlns:a16="http://schemas.microsoft.com/office/drawing/2014/main" id="{1954C3AF-08F5-4F3D-BDDC-AB678DD01390}"/>
+              </a:ext>
+            </a:extLst>
+          </p:cNvPr>
+          <p:cNvPicPr>
+            <a:picLocks noChangeAspect="1"/>
+          </p:cNvPicPr>
+          <p:nvPr/>
+        </p:nvPicPr>
+        <p:blipFill rotWithShape="1">
+          <a:blip r:embed="rId3">
+            <a:extLst>
+              <a:ext uri="{28A0092B-C50C-407E-A947-70E740481C1C}">
+                <a14:useLocalDpi xmlns:a14="http://schemas.microsoft.com/office/drawing/2010/main" val="0"/>
+              </a:ext>
+            </a:extLst>
+          </a:blip>
+          <a:srcRect/>
+          <a:stretch/>
+        </p:blipFill>
+        <p:spPr>
+          <a:xfrm>
+            <a:off x="1420238" y="3429000"/>
+            <a:ext cx="6313252" cy="1108954"/>
           </a:xfrm>
           <a:prstGeom prst="rect">
             <a:avLst/>
@@ -6675,6 +7190,729 @@
 </file>
 
 <file path=ppt/slides/slide6.xml><?xml version="1.0" encoding="utf-8"?>
+<p:sld xmlns:a="http://schemas.openxmlformats.org/drawingml/2006/main" xmlns:r="http://schemas.openxmlformats.org/officeDocument/2006/relationships" xmlns:p="http://schemas.openxmlformats.org/presentationml/2006/main">
+  <p:cSld>
+    <p:spTree>
+      <p:nvGrpSpPr>
+        <p:cNvPr id="1" name=""/>
+        <p:cNvGrpSpPr/>
+        <p:nvPr/>
+      </p:nvGrpSpPr>
+      <p:grpSpPr>
+        <a:xfrm>
+          <a:off x="0" y="0"/>
+          <a:ext cx="0" cy="0"/>
+          <a:chOff x="0" y="0"/>
+          <a:chExt cx="0" cy="0"/>
+        </a:xfrm>
+      </p:grpSpPr>
+      <p:sp>
+        <p:nvSpPr>
+          <p:cNvPr id="2" name="Title 1">
+            <a:extLst>
+              <a:ext uri="{FF2B5EF4-FFF2-40B4-BE49-F238E27FC236}">
+                <a16:creationId xmlns:a16="http://schemas.microsoft.com/office/drawing/2014/main" id="{744217A3-60CE-422E-9F4F-68DCF684279E}"/>
+              </a:ext>
+            </a:extLst>
+          </p:cNvPr>
+          <p:cNvSpPr>
+            <a:spLocks noGrp="1"/>
+          </p:cNvSpPr>
+          <p:nvPr>
+            <p:ph type="title"/>
+          </p:nvPr>
+        </p:nvSpPr>
+        <p:spPr/>
+        <p:txBody>
+          <a:bodyPr/>
+          <a:lstStyle/>
+          <a:p>
+            <a:r>
+              <a:rPr lang="en-US" dirty="0"/>
+              <a:t>Column Dynamics</a:t>
+            </a:r>
+          </a:p>
+        </p:txBody>
+      </p:sp>
+      <p:sp>
+        <p:nvSpPr>
+          <p:cNvPr id="3" name="Content Placeholder 2">
+            <a:extLst>
+              <a:ext uri="{FF2B5EF4-FFF2-40B4-BE49-F238E27FC236}">
+                <a16:creationId xmlns:a16="http://schemas.microsoft.com/office/drawing/2014/main" id="{8F3E923E-66FE-44EA-9AFF-3C91618781F4}"/>
+              </a:ext>
+            </a:extLst>
+          </p:cNvPr>
+          <p:cNvSpPr>
+            <a:spLocks noGrp="1"/>
+          </p:cNvSpPr>
+          <p:nvPr>
+            <p:ph idx="1"/>
+          </p:nvPr>
+        </p:nvSpPr>
+        <p:spPr>
+          <a:xfrm>
+            <a:off x="838200" y="1825625"/>
+            <a:ext cx="6661822" cy="2841270"/>
+          </a:xfrm>
+        </p:spPr>
+        <p:txBody>
+          <a:bodyPr>
+            <a:normAutofit/>
+          </a:bodyPr>
+          <a:lstStyle/>
+          <a:p>
+            <a:r>
+              <a:rPr lang="en-US" dirty="0"/>
+              <a:t>Neuron dynamics (Izhikevich model [3])</a:t>
+            </a:r>
+          </a:p>
+          <a:p>
+            <a:pPr lvl="1"/>
+            <a:r>
+              <a:rPr lang="en-US" dirty="0"/>
+              <a:t>Neurons use a dynamics model with two dimensions</a:t>
+            </a:r>
+          </a:p>
+          <a:p>
+            <a:pPr marL="457200" lvl="1" indent="0">
+              <a:buNone/>
+            </a:pPr>
+            <a:endParaRPr lang="en-US" dirty="0"/>
+          </a:p>
+          <a:p>
+            <a:endParaRPr lang="en-US" dirty="0"/>
+          </a:p>
+          <a:p>
+            <a:r>
+              <a:rPr lang="en-US" dirty="0"/>
+              <a:t>Connection dynamics</a:t>
+            </a:r>
+          </a:p>
+          <a:p>
+            <a:pPr lvl="1"/>
+            <a:r>
+              <a:rPr lang="en-US" dirty="0"/>
+              <a:t>When a neuron fires, signal to connected neuron delayed and smoothed</a:t>
+            </a:r>
+          </a:p>
+        </p:txBody>
+      </p:sp>
+      <p:pic>
+        <p:nvPicPr>
+          <p:cNvPr id="4" name="Picture 3">
+            <a:extLst>
+              <a:ext uri="{FF2B5EF4-FFF2-40B4-BE49-F238E27FC236}">
+                <a16:creationId xmlns:a16="http://schemas.microsoft.com/office/drawing/2014/main" id="{F2C3A460-7E0A-4B91-ADDF-B0079760731B}"/>
+              </a:ext>
+            </a:extLst>
+          </p:cNvPr>
+          <p:cNvPicPr>
+            <a:picLocks noChangeAspect="1"/>
+          </p:cNvPicPr>
+          <p:nvPr/>
+        </p:nvPicPr>
+        <p:blipFill rotWithShape="1">
+          <a:blip r:embed="rId2">
+            <a:extLst>
+              <a:ext uri="{28A0092B-C50C-407E-A947-70E740481C1C}">
+                <a14:useLocalDpi xmlns:a14="http://schemas.microsoft.com/office/drawing/2010/main" val="0"/>
+              </a:ext>
+            </a:extLst>
+          </a:blip>
+          <a:srcRect/>
+          <a:stretch/>
+        </p:blipFill>
+        <p:spPr>
+          <a:xfrm>
+            <a:off x="1566152" y="2529192"/>
+            <a:ext cx="2966937" cy="1011676"/>
+          </a:xfrm>
+          <a:prstGeom prst="rect">
+            <a:avLst/>
+          </a:prstGeom>
+        </p:spPr>
+      </p:pic>
+      <p:sp>
+        <p:nvSpPr>
+          <p:cNvPr id="5" name="TextBox 4">
+            <a:extLst>
+              <a:ext uri="{FF2B5EF4-FFF2-40B4-BE49-F238E27FC236}">
+                <a16:creationId xmlns:a16="http://schemas.microsoft.com/office/drawing/2014/main" id="{395615C1-38AA-48F9-AA75-702CB5AA6C60}"/>
+              </a:ext>
+            </a:extLst>
+          </p:cNvPr>
+          <p:cNvSpPr txBox="1"/>
+          <p:nvPr/>
+        </p:nvSpPr>
+        <p:spPr>
+          <a:xfrm>
+            <a:off x="5090276" y="2573365"/>
+            <a:ext cx="4497706" cy="830997"/>
+          </a:xfrm>
+          <a:prstGeom prst="rect">
+            <a:avLst/>
+          </a:prstGeom>
+          <a:noFill/>
+        </p:spPr>
+        <p:txBody>
+          <a:bodyPr wrap="none" rtlCol="0">
+            <a:spAutoFit/>
+          </a:bodyPr>
+          <a:lstStyle/>
+          <a:p>
+            <a:r>
+              <a:rPr lang="en-US" sz="1200" dirty="0"/>
+              <a:t>v – neuron membrane voltage</a:t>
+            </a:r>
+          </a:p>
+          <a:p>
+            <a:r>
+              <a:rPr lang="en-US" sz="1200" dirty="0"/>
+              <a:t>u – recovery parameter</a:t>
+            </a:r>
+          </a:p>
+          <a:p>
+            <a:r>
+              <a:rPr lang="en-US" sz="1200" dirty="0"/>
+              <a:t>I – injected current, includes signals from other neurons and stimulus</a:t>
+            </a:r>
+          </a:p>
+          <a:p>
+            <a:r>
+              <a:rPr lang="en-US" sz="1200" dirty="0" err="1"/>
+              <a:t>a,b,c,d</a:t>
+            </a:r>
+            <a:r>
+              <a:rPr lang="en-US" sz="1200" dirty="0"/>
+              <a:t> are model parameters</a:t>
+            </a:r>
+          </a:p>
+        </p:txBody>
+      </p:sp>
+      <p:pic>
+        <p:nvPicPr>
+          <p:cNvPr id="7" name="Picture 6">
+            <a:extLst>
+              <a:ext uri="{FF2B5EF4-FFF2-40B4-BE49-F238E27FC236}">
+                <a16:creationId xmlns:a16="http://schemas.microsoft.com/office/drawing/2014/main" id="{F385609C-4D1E-4FD0-A221-700958535352}"/>
+              </a:ext>
+            </a:extLst>
+          </p:cNvPr>
+          <p:cNvPicPr>
+            <a:picLocks noChangeAspect="1"/>
+          </p:cNvPicPr>
+          <p:nvPr/>
+        </p:nvPicPr>
+        <p:blipFill rotWithShape="1">
+          <a:blip r:embed="rId3">
+            <a:extLst>
+              <a:ext uri="{28A0092B-C50C-407E-A947-70E740481C1C}">
+                <a14:useLocalDpi xmlns:a14="http://schemas.microsoft.com/office/drawing/2010/main" val="0"/>
+              </a:ext>
+            </a:extLst>
+          </a:blip>
+          <a:srcRect/>
+          <a:stretch/>
+        </p:blipFill>
+        <p:spPr>
+          <a:xfrm>
+            <a:off x="885713" y="4601993"/>
+            <a:ext cx="6391073" cy="1254868"/>
+          </a:xfrm>
+          <a:prstGeom prst="rect">
+            <a:avLst/>
+          </a:prstGeom>
+        </p:spPr>
+      </p:pic>
+      <p:grpSp>
+        <p:nvGrpSpPr>
+          <p:cNvPr id="26" name="Group 25">
+            <a:extLst>
+              <a:ext uri="{FF2B5EF4-FFF2-40B4-BE49-F238E27FC236}">
+                <a16:creationId xmlns:a16="http://schemas.microsoft.com/office/drawing/2014/main" id="{77553791-C5D2-4B14-8075-F2EACDFB3036}"/>
+              </a:ext>
+            </a:extLst>
+          </p:cNvPr>
+          <p:cNvGrpSpPr/>
+          <p:nvPr/>
+        </p:nvGrpSpPr>
+        <p:grpSpPr>
+          <a:xfrm>
+            <a:off x="8284705" y="4425679"/>
+            <a:ext cx="2775644" cy="1994576"/>
+            <a:chOff x="8722450" y="5141580"/>
+            <a:chExt cx="2269805" cy="1607495"/>
+          </a:xfrm>
+        </p:grpSpPr>
+        <p:grpSp>
+          <p:nvGrpSpPr>
+            <p:cNvPr id="18" name="Group 17">
+              <a:extLst>
+                <a:ext uri="{FF2B5EF4-FFF2-40B4-BE49-F238E27FC236}">
+                  <a16:creationId xmlns:a16="http://schemas.microsoft.com/office/drawing/2014/main" id="{027C4655-F1DE-4E99-AA55-4950092ABAAA}"/>
+                </a:ext>
+              </a:extLst>
+            </p:cNvPr>
+            <p:cNvGrpSpPr/>
+            <p:nvPr/>
+          </p:nvGrpSpPr>
+          <p:grpSpPr>
+            <a:xfrm>
+              <a:off x="8722450" y="5141580"/>
+              <a:ext cx="2250350" cy="1607495"/>
+              <a:chOff x="8148749" y="3809578"/>
+              <a:chExt cx="1731063" cy="1225784"/>
+            </a:xfrm>
+          </p:grpSpPr>
+          <p:grpSp>
+            <p:nvGrpSpPr>
+              <p:cNvPr id="19" name="Group 18">
+                <a:extLst>
+                  <a:ext uri="{FF2B5EF4-FFF2-40B4-BE49-F238E27FC236}">
+                    <a16:creationId xmlns:a16="http://schemas.microsoft.com/office/drawing/2014/main" id="{E6778553-D1E6-4A43-8375-B52866AFA977}"/>
+                  </a:ext>
+                </a:extLst>
+              </p:cNvPr>
+              <p:cNvGrpSpPr/>
+              <p:nvPr/>
+            </p:nvGrpSpPr>
+            <p:grpSpPr>
+              <a:xfrm>
+                <a:off x="8394970" y="3809578"/>
+                <a:ext cx="1484842" cy="954922"/>
+                <a:chOff x="8103140" y="3607353"/>
+                <a:chExt cx="1484842" cy="954922"/>
+              </a:xfrm>
+            </p:grpSpPr>
+            <p:cxnSp>
+              <p:nvCxnSpPr>
+                <p:cNvPr id="22" name="Straight Connector 21">
+                  <a:extLst>
+                    <a:ext uri="{FF2B5EF4-FFF2-40B4-BE49-F238E27FC236}">
+                      <a16:creationId xmlns:a16="http://schemas.microsoft.com/office/drawing/2014/main" id="{85783FC8-410C-41AF-B18E-6F2140325D39}"/>
+                    </a:ext>
+                  </a:extLst>
+                </p:cNvPr>
+                <p:cNvCxnSpPr/>
+                <p:nvPr/>
+              </p:nvCxnSpPr>
+              <p:spPr>
+                <a:xfrm>
+                  <a:off x="8103140" y="3607353"/>
+                  <a:ext cx="0" cy="946839"/>
+                </a:xfrm>
+                <a:prstGeom prst="line">
+                  <a:avLst/>
+                </a:prstGeom>
+                <a:ln w="12700">
+                  <a:solidFill>
+                    <a:schemeClr val="tx1"/>
+                  </a:solidFill>
+                </a:ln>
+              </p:spPr>
+              <p:style>
+                <a:lnRef idx="1">
+                  <a:schemeClr val="accent1"/>
+                </a:lnRef>
+                <a:fillRef idx="0">
+                  <a:schemeClr val="accent1"/>
+                </a:fillRef>
+                <a:effectRef idx="0">
+                  <a:schemeClr val="accent1"/>
+                </a:effectRef>
+                <a:fontRef idx="minor">
+                  <a:schemeClr val="tx1"/>
+                </a:fontRef>
+              </p:style>
+            </p:cxnSp>
+            <p:cxnSp>
+              <p:nvCxnSpPr>
+                <p:cNvPr id="23" name="Straight Connector 22">
+                  <a:extLst>
+                    <a:ext uri="{FF2B5EF4-FFF2-40B4-BE49-F238E27FC236}">
+                      <a16:creationId xmlns:a16="http://schemas.microsoft.com/office/drawing/2014/main" id="{032E18E8-0B09-4A8E-B4B1-D557A5B9A60B}"/>
+                    </a:ext>
+                  </a:extLst>
+                </p:cNvPr>
+                <p:cNvCxnSpPr>
+                  <a:cxnSpLocks/>
+                </p:cNvCxnSpPr>
+                <p:nvPr/>
+              </p:nvCxnSpPr>
+              <p:spPr>
+                <a:xfrm>
+                  <a:off x="8103140" y="4562275"/>
+                  <a:ext cx="1484842" cy="0"/>
+                </a:xfrm>
+                <a:prstGeom prst="line">
+                  <a:avLst/>
+                </a:prstGeom>
+                <a:ln w="12700">
+                  <a:solidFill>
+                    <a:schemeClr val="tx1"/>
+                  </a:solidFill>
+                </a:ln>
+              </p:spPr>
+              <p:style>
+                <a:lnRef idx="1">
+                  <a:schemeClr val="accent1"/>
+                </a:lnRef>
+                <a:fillRef idx="0">
+                  <a:schemeClr val="accent1"/>
+                </a:fillRef>
+                <a:effectRef idx="0">
+                  <a:schemeClr val="accent1"/>
+                </a:effectRef>
+                <a:fontRef idx="minor">
+                  <a:schemeClr val="tx1"/>
+                </a:fontRef>
+              </p:style>
+            </p:cxnSp>
+          </p:grpSp>
+          <p:sp>
+            <p:nvSpPr>
+              <p:cNvPr id="20" name="TextBox 19">
+                <a:extLst>
+                  <a:ext uri="{FF2B5EF4-FFF2-40B4-BE49-F238E27FC236}">
+                    <a16:creationId xmlns:a16="http://schemas.microsoft.com/office/drawing/2014/main" id="{FBD25090-BAE3-463B-AE65-74EEAA673C58}"/>
+                  </a:ext>
+                </a:extLst>
+              </p:cNvPr>
+              <p:cNvSpPr txBox="1"/>
+              <p:nvPr/>
+            </p:nvSpPr>
+            <p:spPr>
+              <a:xfrm>
+                <a:off x="8812622" y="4789141"/>
+                <a:ext cx="442750" cy="246221"/>
+              </a:xfrm>
+              <a:prstGeom prst="rect">
+                <a:avLst/>
+              </a:prstGeom>
+              <a:noFill/>
+            </p:spPr>
+            <p:txBody>
+              <a:bodyPr wrap="none" rtlCol="0">
+                <a:spAutoFit/>
+              </a:bodyPr>
+              <a:lstStyle/>
+              <a:p>
+                <a:r>
+                  <a:rPr lang="en-US" sz="1000" dirty="0"/>
+                  <a:t>Time</a:t>
+                </a:r>
+              </a:p>
+            </p:txBody>
+          </p:sp>
+          <p:sp>
+            <p:nvSpPr>
+              <p:cNvPr id="21" name="TextBox 20">
+                <a:extLst>
+                  <a:ext uri="{FF2B5EF4-FFF2-40B4-BE49-F238E27FC236}">
+                    <a16:creationId xmlns:a16="http://schemas.microsoft.com/office/drawing/2014/main" id="{61050077-FA05-4B9A-9E33-57FCA5C397A4}"/>
+                  </a:ext>
+                </a:extLst>
+              </p:cNvPr>
+              <p:cNvSpPr txBox="1"/>
+              <p:nvPr/>
+            </p:nvSpPr>
+            <p:spPr>
+              <a:xfrm rot="16200000">
+                <a:off x="8026440" y="4041312"/>
+                <a:ext cx="490840" cy="246221"/>
+              </a:xfrm>
+              <a:prstGeom prst="rect">
+                <a:avLst/>
+              </a:prstGeom>
+              <a:noFill/>
+            </p:spPr>
+            <p:txBody>
+              <a:bodyPr wrap="none" rtlCol="0">
+                <a:spAutoFit/>
+              </a:bodyPr>
+              <a:lstStyle/>
+              <a:p>
+                <a:r>
+                  <a:rPr lang="en-US" sz="1000" dirty="0"/>
+                  <a:t>Signal</a:t>
+                </a:r>
+              </a:p>
+            </p:txBody>
+          </p:sp>
+        </p:grpSp>
+        <p:sp>
+          <p:nvSpPr>
+            <p:cNvPr id="25" name="Freeform: Shape 24">
+              <a:extLst>
+                <a:ext uri="{FF2B5EF4-FFF2-40B4-BE49-F238E27FC236}">
+                  <a16:creationId xmlns:a16="http://schemas.microsoft.com/office/drawing/2014/main" id="{28AFFFF0-201A-4804-AC35-B2553AC479D0}"/>
+                </a:ext>
+              </a:extLst>
+            </p:cNvPr>
+            <p:cNvSpPr/>
+            <p:nvPr/>
+          </p:nvSpPr>
+          <p:spPr>
+            <a:xfrm>
+              <a:off x="9046723" y="5630129"/>
+              <a:ext cx="1945532" cy="585845"/>
+            </a:xfrm>
+            <a:custGeom>
+              <a:avLst/>
+              <a:gdLst>
+                <a:gd name="connsiteX0" fmla="*/ 0 w 1945532"/>
+                <a:gd name="connsiteY0" fmla="*/ 585845 h 585845"/>
+                <a:gd name="connsiteX1" fmla="*/ 924128 w 1945532"/>
+                <a:gd name="connsiteY1" fmla="*/ 576118 h 585845"/>
+                <a:gd name="connsiteX2" fmla="*/ 1001949 w 1945532"/>
+                <a:gd name="connsiteY2" fmla="*/ 498297 h 585845"/>
+                <a:gd name="connsiteX3" fmla="*/ 1167320 w 1945532"/>
+                <a:gd name="connsiteY3" fmla="*/ 11914 h 585845"/>
+                <a:gd name="connsiteX4" fmla="*/ 1303507 w 1945532"/>
+                <a:gd name="connsiteY4" fmla="*/ 177284 h 585845"/>
+                <a:gd name="connsiteX5" fmla="*/ 1391056 w 1945532"/>
+                <a:gd name="connsiteY5" fmla="*/ 488569 h 585845"/>
+                <a:gd name="connsiteX6" fmla="*/ 1507788 w 1945532"/>
+                <a:gd name="connsiteY6" fmla="*/ 546935 h 585845"/>
+                <a:gd name="connsiteX7" fmla="*/ 1945532 w 1945532"/>
+                <a:gd name="connsiteY7" fmla="*/ 546935 h 585845"/>
+              </a:gdLst>
+              <a:ahLst/>
+              <a:cxnLst>
+                <a:cxn ang="0">
+                  <a:pos x="connsiteX0" y="connsiteY0"/>
+                </a:cxn>
+                <a:cxn ang="0">
+                  <a:pos x="connsiteX1" y="connsiteY1"/>
+                </a:cxn>
+                <a:cxn ang="0">
+                  <a:pos x="connsiteX2" y="connsiteY2"/>
+                </a:cxn>
+                <a:cxn ang="0">
+                  <a:pos x="connsiteX3" y="connsiteY3"/>
+                </a:cxn>
+                <a:cxn ang="0">
+                  <a:pos x="connsiteX4" y="connsiteY4"/>
+                </a:cxn>
+                <a:cxn ang="0">
+                  <a:pos x="connsiteX5" y="connsiteY5"/>
+                </a:cxn>
+                <a:cxn ang="0">
+                  <a:pos x="connsiteX6" y="connsiteY6"/>
+                </a:cxn>
+                <a:cxn ang="0">
+                  <a:pos x="connsiteX7" y="connsiteY7"/>
+                </a:cxn>
+              </a:cxnLst>
+              <a:rect l="l" t="t" r="r" b="b"/>
+              <a:pathLst>
+                <a:path w="1945532" h="585845">
+                  <a:moveTo>
+                    <a:pt x="0" y="585845"/>
+                  </a:moveTo>
+                  <a:lnTo>
+                    <a:pt x="924128" y="576118"/>
+                  </a:lnTo>
+                  <a:cubicBezTo>
+                    <a:pt x="1091120" y="561527"/>
+                    <a:pt x="961417" y="592331"/>
+                    <a:pt x="1001949" y="498297"/>
+                  </a:cubicBezTo>
+                  <a:cubicBezTo>
+                    <a:pt x="1042481" y="404263"/>
+                    <a:pt x="1117060" y="65416"/>
+                    <a:pt x="1167320" y="11914"/>
+                  </a:cubicBezTo>
+                  <a:cubicBezTo>
+                    <a:pt x="1217580" y="-41588"/>
+                    <a:pt x="1266218" y="97842"/>
+                    <a:pt x="1303507" y="177284"/>
+                  </a:cubicBezTo>
+                  <a:cubicBezTo>
+                    <a:pt x="1340796" y="256726"/>
+                    <a:pt x="1357009" y="426961"/>
+                    <a:pt x="1391056" y="488569"/>
+                  </a:cubicBezTo>
+                  <a:cubicBezTo>
+                    <a:pt x="1425103" y="550177"/>
+                    <a:pt x="1415375" y="537207"/>
+                    <a:pt x="1507788" y="546935"/>
+                  </a:cubicBezTo>
+                  <a:cubicBezTo>
+                    <a:pt x="1600201" y="556663"/>
+                    <a:pt x="1772866" y="551799"/>
+                    <a:pt x="1945532" y="546935"/>
+                  </a:cubicBezTo>
+                </a:path>
+              </a:pathLst>
+            </a:custGeom>
+            <a:noFill/>
+            <a:ln>
+              <a:solidFill>
+                <a:schemeClr val="accent1"/>
+              </a:solidFill>
+            </a:ln>
+          </p:spPr>
+          <p:style>
+            <a:lnRef idx="2">
+              <a:schemeClr val="accent1">
+                <a:shade val="50000"/>
+              </a:schemeClr>
+            </a:lnRef>
+            <a:fillRef idx="1">
+              <a:schemeClr val="accent1"/>
+            </a:fillRef>
+            <a:effectRef idx="0">
+              <a:schemeClr val="accent1"/>
+            </a:effectRef>
+            <a:fontRef idx="minor">
+              <a:schemeClr val="lt1"/>
+            </a:fontRef>
+          </p:style>
+          <p:txBody>
+            <a:bodyPr rtlCol="0" anchor="ctr"/>
+            <a:lstStyle/>
+            <a:p>
+              <a:pPr algn="ctr"/>
+              <a:endParaRPr lang="en-US"/>
+            </a:p>
+          </p:txBody>
+        </p:sp>
+      </p:grpSp>
+      <p:cxnSp>
+        <p:nvCxnSpPr>
+          <p:cNvPr id="28" name="Straight Connector 27">
+            <a:extLst>
+              <a:ext uri="{FF2B5EF4-FFF2-40B4-BE49-F238E27FC236}">
+                <a16:creationId xmlns:a16="http://schemas.microsoft.com/office/drawing/2014/main" id="{FD38C60C-A1B9-43C4-A7C2-3D089012ED5E}"/>
+              </a:ext>
+            </a:extLst>
+          </p:cNvPr>
+          <p:cNvCxnSpPr/>
+          <p:nvPr/>
+        </p:nvCxnSpPr>
+        <p:spPr>
+          <a:xfrm>
+            <a:off x="9085634" y="4425679"/>
+            <a:ext cx="0" cy="1593929"/>
+          </a:xfrm>
+          <a:prstGeom prst="line">
+            <a:avLst/>
+          </a:prstGeom>
+          <a:ln>
+            <a:solidFill>
+              <a:srgbClr val="FF0000"/>
+            </a:solidFill>
+          </a:ln>
+        </p:spPr>
+        <p:style>
+          <a:lnRef idx="1">
+            <a:schemeClr val="accent1"/>
+          </a:lnRef>
+          <a:fillRef idx="0">
+            <a:schemeClr val="accent1"/>
+          </a:fillRef>
+          <a:effectRef idx="0">
+            <a:schemeClr val="accent1"/>
+          </a:effectRef>
+          <a:fontRef idx="minor">
+            <a:schemeClr val="tx1"/>
+          </a:fontRef>
+        </p:style>
+      </p:cxnSp>
+      <p:sp>
+        <p:nvSpPr>
+          <p:cNvPr id="29" name="TextBox 28">
+            <a:extLst>
+              <a:ext uri="{FF2B5EF4-FFF2-40B4-BE49-F238E27FC236}">
+                <a16:creationId xmlns:a16="http://schemas.microsoft.com/office/drawing/2014/main" id="{3A325651-4D31-4B93-BB41-579C5103EDA2}"/>
+              </a:ext>
+            </a:extLst>
+          </p:cNvPr>
+          <p:cNvSpPr txBox="1"/>
+          <p:nvPr/>
+        </p:nvSpPr>
+        <p:spPr>
+          <a:xfrm>
+            <a:off x="8687928" y="4188271"/>
+            <a:ext cx="795411" cy="230832"/>
+          </a:xfrm>
+          <a:prstGeom prst="rect">
+            <a:avLst/>
+          </a:prstGeom>
+          <a:noFill/>
+        </p:spPr>
+        <p:txBody>
+          <a:bodyPr wrap="none" rtlCol="0">
+            <a:spAutoFit/>
+          </a:bodyPr>
+          <a:lstStyle/>
+          <a:p>
+            <a:r>
+              <a:rPr lang="en-US" sz="900" dirty="0">
+                <a:solidFill>
+                  <a:srgbClr val="FF0000"/>
+                </a:solidFill>
+              </a:rPr>
+              <a:t>Neuron fires</a:t>
+            </a:r>
+          </a:p>
+        </p:txBody>
+      </p:sp>
+      <p:sp>
+        <p:nvSpPr>
+          <p:cNvPr id="30" name="TextBox 29">
+            <a:extLst>
+              <a:ext uri="{FF2B5EF4-FFF2-40B4-BE49-F238E27FC236}">
+                <a16:creationId xmlns:a16="http://schemas.microsoft.com/office/drawing/2014/main" id="{6187EF30-A96A-4BE3-AFC1-EC03FFDF3335}"/>
+              </a:ext>
+            </a:extLst>
+          </p:cNvPr>
+          <p:cNvSpPr txBox="1"/>
+          <p:nvPr/>
+        </p:nvSpPr>
+        <p:spPr>
+          <a:xfrm>
+            <a:off x="9684041" y="4676091"/>
+            <a:ext cx="2000663" cy="369332"/>
+          </a:xfrm>
+          <a:prstGeom prst="rect">
+            <a:avLst/>
+          </a:prstGeom>
+          <a:noFill/>
+        </p:spPr>
+        <p:txBody>
+          <a:bodyPr wrap="square" rtlCol="0">
+            <a:spAutoFit/>
+          </a:bodyPr>
+          <a:lstStyle/>
+          <a:p>
+            <a:r>
+              <a:rPr lang="en-US" sz="900" dirty="0">
+                <a:solidFill>
+                  <a:schemeClr val="accent1"/>
+                </a:solidFill>
+              </a:rPr>
+              <a:t>Stimulus to connected neuron delivered with delay and smoothing</a:t>
+            </a:r>
+          </a:p>
+        </p:txBody>
+      </p:sp>
+    </p:spTree>
+    <p:extLst>
+      <p:ext uri="{BB962C8B-B14F-4D97-AF65-F5344CB8AC3E}">
+        <p14:creationId xmlns:p14="http://schemas.microsoft.com/office/powerpoint/2010/main" val="2038993697"/>
+      </p:ext>
+    </p:extLst>
+  </p:cSld>
+  <p:clrMapOvr>
+    <a:masterClrMapping/>
+  </p:clrMapOvr>
+</p:sld>
+</file>
+
+<file path=ppt/slides/slide7.xml><?xml version="1.0" encoding="utf-8"?>
 <p:sld xmlns:a="http://schemas.openxmlformats.org/drawingml/2006/main" xmlns:r="http://schemas.openxmlformats.org/officeDocument/2006/relationships" xmlns:p="http://schemas.openxmlformats.org/presentationml/2006/main">
   <p:cSld>
     <p:spTree>
@@ -7294,318 +8532,6 @@
 </p:sld>
 </file>
 
-<file path=ppt/slides/slide7.xml><?xml version="1.0" encoding="utf-8"?>
-<p:sld xmlns:a="http://schemas.openxmlformats.org/drawingml/2006/main" xmlns:r="http://schemas.openxmlformats.org/officeDocument/2006/relationships" xmlns:p="http://schemas.openxmlformats.org/presentationml/2006/main">
-  <p:cSld>
-    <p:spTree>
-      <p:nvGrpSpPr>
-        <p:cNvPr id="1" name=""/>
-        <p:cNvGrpSpPr/>
-        <p:nvPr/>
-      </p:nvGrpSpPr>
-      <p:grpSpPr>
-        <a:xfrm>
-          <a:off x="0" y="0"/>
-          <a:ext cx="0" cy="0"/>
-          <a:chOff x="0" y="0"/>
-          <a:chExt cx="0" cy="0"/>
-        </a:xfrm>
-      </p:grpSpPr>
-      <p:sp>
-        <p:nvSpPr>
-          <p:cNvPr id="2" name="Title 1">
-            <a:extLst>
-              <a:ext uri="{FF2B5EF4-FFF2-40B4-BE49-F238E27FC236}">
-                <a16:creationId xmlns:a16="http://schemas.microsoft.com/office/drawing/2014/main" id="{4FB266C6-FF38-4ABD-BF93-C7DC512DDF68}"/>
-              </a:ext>
-            </a:extLst>
-          </p:cNvPr>
-          <p:cNvSpPr>
-            <a:spLocks noGrp="1"/>
-          </p:cNvSpPr>
-          <p:nvPr>
-            <p:ph type="title"/>
-          </p:nvPr>
-        </p:nvSpPr>
-        <p:spPr/>
-        <p:txBody>
-          <a:bodyPr/>
-          <a:lstStyle/>
-          <a:p>
-            <a:r>
-              <a:rPr lang="en-US" dirty="0"/>
-              <a:t>Wave detection and labeling</a:t>
-            </a:r>
-          </a:p>
-        </p:txBody>
-      </p:sp>
-      <p:sp>
-        <p:nvSpPr>
-          <p:cNvPr id="3" name="Content Placeholder 2">
-            <a:extLst>
-              <a:ext uri="{FF2B5EF4-FFF2-40B4-BE49-F238E27FC236}">
-                <a16:creationId xmlns:a16="http://schemas.microsoft.com/office/drawing/2014/main" id="{A3D41532-6034-4CEF-8FE3-EEF2BE7B2DB2}"/>
-              </a:ext>
-            </a:extLst>
-          </p:cNvPr>
-          <p:cNvSpPr>
-            <a:spLocks noGrp="1"/>
-          </p:cNvSpPr>
-          <p:nvPr>
-            <p:ph idx="1"/>
-          </p:nvPr>
-        </p:nvSpPr>
-        <p:spPr>
-          <a:xfrm>
-            <a:off x="838200" y="1825625"/>
-            <a:ext cx="10515600" cy="871393"/>
-          </a:xfrm>
-        </p:spPr>
-        <p:txBody>
-          <a:bodyPr>
-            <a:normAutofit fontScale="77500" lnSpcReduction="20000"/>
-          </a:bodyPr>
-          <a:lstStyle/>
-          <a:p>
-            <a:r>
-              <a:rPr lang="en-US" dirty="0"/>
-              <a:t>Need to determine wave properties, requires detection and labeling</a:t>
-            </a:r>
-          </a:p>
-          <a:p>
-            <a:r>
-              <a:rPr lang="en-US" dirty="0"/>
-              <a:t>Method: apply a density filter to remove background firing events, then use a plane sweep algorithm to label the waves</a:t>
-            </a:r>
-          </a:p>
-        </p:txBody>
-      </p:sp>
-      <p:pic>
-        <p:nvPicPr>
-          <p:cNvPr id="7" name="Picture 6">
-            <a:extLst>
-              <a:ext uri="{FF2B5EF4-FFF2-40B4-BE49-F238E27FC236}">
-                <a16:creationId xmlns:a16="http://schemas.microsoft.com/office/drawing/2014/main" id="{3506C698-1191-4975-AA49-5601D932B7F9}"/>
-              </a:ext>
-            </a:extLst>
-          </p:cNvPr>
-          <p:cNvPicPr>
-            <a:picLocks noChangeAspect="1"/>
-          </p:cNvPicPr>
-          <p:nvPr/>
-        </p:nvPicPr>
-        <p:blipFill>
-          <a:blip r:embed="rId2">
-            <a:extLst>
-              <a:ext uri="{28A0092B-C50C-407E-A947-70E740481C1C}">
-                <a14:useLocalDpi xmlns:a14="http://schemas.microsoft.com/office/drawing/2010/main" val="0"/>
-              </a:ext>
-            </a:extLst>
-          </a:blip>
-          <a:stretch>
-            <a:fillRect/>
-          </a:stretch>
-        </p:blipFill>
-        <p:spPr>
-          <a:xfrm>
-            <a:off x="4081896" y="3148323"/>
-            <a:ext cx="4028208" cy="3021156"/>
-          </a:xfrm>
-          <a:prstGeom prst="rect">
-            <a:avLst/>
-          </a:prstGeom>
-        </p:spPr>
-      </p:pic>
-      <p:pic>
-        <p:nvPicPr>
-          <p:cNvPr id="9" name="Picture 8">
-            <a:extLst>
-              <a:ext uri="{FF2B5EF4-FFF2-40B4-BE49-F238E27FC236}">
-                <a16:creationId xmlns:a16="http://schemas.microsoft.com/office/drawing/2014/main" id="{1DC03AEE-6B6C-4599-8547-9EAF1414A378}"/>
-              </a:ext>
-            </a:extLst>
-          </p:cNvPr>
-          <p:cNvPicPr>
-            <a:picLocks noChangeAspect="1"/>
-          </p:cNvPicPr>
-          <p:nvPr/>
-        </p:nvPicPr>
-        <p:blipFill>
-          <a:blip r:embed="rId3">
-            <a:extLst>
-              <a:ext uri="{28A0092B-C50C-407E-A947-70E740481C1C}">
-                <a14:useLocalDpi xmlns:a14="http://schemas.microsoft.com/office/drawing/2010/main" val="0"/>
-              </a:ext>
-            </a:extLst>
-          </a:blip>
-          <a:stretch>
-            <a:fillRect/>
-          </a:stretch>
-        </p:blipFill>
-        <p:spPr>
-          <a:xfrm>
-            <a:off x="382397" y="3155807"/>
-            <a:ext cx="4028208" cy="3021156"/>
-          </a:xfrm>
-          <a:prstGeom prst="rect">
-            <a:avLst/>
-          </a:prstGeom>
-        </p:spPr>
-      </p:pic>
-      <p:pic>
-        <p:nvPicPr>
-          <p:cNvPr id="11" name="Picture 10">
-            <a:extLst>
-              <a:ext uri="{FF2B5EF4-FFF2-40B4-BE49-F238E27FC236}">
-                <a16:creationId xmlns:a16="http://schemas.microsoft.com/office/drawing/2014/main" id="{FE4E9FB2-3656-46DC-9F77-64CA6E178E79}"/>
-              </a:ext>
-            </a:extLst>
-          </p:cNvPr>
-          <p:cNvPicPr>
-            <a:picLocks noChangeAspect="1"/>
-          </p:cNvPicPr>
-          <p:nvPr/>
-        </p:nvPicPr>
-        <p:blipFill>
-          <a:blip r:embed="rId4">
-            <a:extLst>
-              <a:ext uri="{28A0092B-C50C-407E-A947-70E740481C1C}">
-                <a14:useLocalDpi xmlns:a14="http://schemas.microsoft.com/office/drawing/2010/main" val="0"/>
-              </a:ext>
-            </a:extLst>
-          </a:blip>
-          <a:stretch>
-            <a:fillRect/>
-          </a:stretch>
-        </p:blipFill>
-        <p:spPr>
-          <a:xfrm>
-            <a:off x="7998113" y="3155807"/>
-            <a:ext cx="4028208" cy="3021156"/>
-          </a:xfrm>
-          <a:prstGeom prst="rect">
-            <a:avLst/>
-          </a:prstGeom>
-        </p:spPr>
-      </p:pic>
-      <p:sp>
-        <p:nvSpPr>
-          <p:cNvPr id="12" name="TextBox 11">
-            <a:extLst>
-              <a:ext uri="{FF2B5EF4-FFF2-40B4-BE49-F238E27FC236}">
-                <a16:creationId xmlns:a16="http://schemas.microsoft.com/office/drawing/2014/main" id="{42C5ECCC-A615-4616-AC27-728D85AA3D32}"/>
-              </a:ext>
-            </a:extLst>
-          </p:cNvPr>
-          <p:cNvSpPr txBox="1"/>
-          <p:nvPr/>
-        </p:nvSpPr>
-        <p:spPr>
-          <a:xfrm>
-            <a:off x="1333760" y="2963657"/>
-            <a:ext cx="1796774" cy="369332"/>
-          </a:xfrm>
-          <a:prstGeom prst="rect">
-            <a:avLst/>
-          </a:prstGeom>
-          <a:noFill/>
-        </p:spPr>
-        <p:txBody>
-          <a:bodyPr wrap="none" rtlCol="0">
-            <a:spAutoFit/>
-          </a:bodyPr>
-          <a:lstStyle/>
-          <a:p>
-            <a:r>
-              <a:rPr lang="en-US" i="1" dirty="0"/>
-              <a:t>Raw firing events</a:t>
-            </a:r>
-          </a:p>
-        </p:txBody>
-      </p:sp>
-      <p:sp>
-        <p:nvSpPr>
-          <p:cNvPr id="13" name="TextBox 12">
-            <a:extLst>
-              <a:ext uri="{FF2B5EF4-FFF2-40B4-BE49-F238E27FC236}">
-                <a16:creationId xmlns:a16="http://schemas.microsoft.com/office/drawing/2014/main" id="{0B4FAF95-F832-41D3-816D-95E067807461}"/>
-              </a:ext>
-            </a:extLst>
-          </p:cNvPr>
-          <p:cNvSpPr txBox="1"/>
-          <p:nvPr/>
-        </p:nvSpPr>
-        <p:spPr>
-          <a:xfrm>
-            <a:off x="5518562" y="2962441"/>
-            <a:ext cx="1371594" cy="369332"/>
-          </a:xfrm>
-          <a:prstGeom prst="rect">
-            <a:avLst/>
-          </a:prstGeom>
-          <a:noFill/>
-        </p:spPr>
-        <p:txBody>
-          <a:bodyPr wrap="none" rtlCol="0">
-            <a:spAutoFit/>
-          </a:bodyPr>
-          <a:lstStyle/>
-          <a:p>
-            <a:r>
-              <a:rPr lang="en-US" i="1" dirty="0"/>
-              <a:t>Density filter</a:t>
-            </a:r>
-          </a:p>
-        </p:txBody>
-      </p:sp>
-      <p:sp>
-        <p:nvSpPr>
-          <p:cNvPr id="14" name="TextBox 13">
-            <a:extLst>
-              <a:ext uri="{FF2B5EF4-FFF2-40B4-BE49-F238E27FC236}">
-                <a16:creationId xmlns:a16="http://schemas.microsoft.com/office/drawing/2014/main" id="{73308B3D-9FB5-4555-8DC0-FDDDE576E9AF}"/>
-              </a:ext>
-            </a:extLst>
-          </p:cNvPr>
-          <p:cNvSpPr txBox="1"/>
-          <p:nvPr/>
-        </p:nvSpPr>
-        <p:spPr>
-          <a:xfrm>
-            <a:off x="9326420" y="2962441"/>
-            <a:ext cx="1552028" cy="369332"/>
-          </a:xfrm>
-          <a:prstGeom prst="rect">
-            <a:avLst/>
-          </a:prstGeom>
-          <a:noFill/>
-        </p:spPr>
-        <p:txBody>
-          <a:bodyPr wrap="none" rtlCol="0">
-            <a:spAutoFit/>
-          </a:bodyPr>
-          <a:lstStyle/>
-          <a:p>
-            <a:r>
-              <a:rPr lang="en-US" i="1" dirty="0"/>
-              <a:t>Labeled waves</a:t>
-            </a:r>
-          </a:p>
-        </p:txBody>
-      </p:sp>
-    </p:spTree>
-    <p:extLst>
-      <p:ext uri="{BB962C8B-B14F-4D97-AF65-F5344CB8AC3E}">
-        <p14:creationId xmlns:p14="http://schemas.microsoft.com/office/powerpoint/2010/main" val="1216758892"/>
-      </p:ext>
-    </p:extLst>
-  </p:cSld>
-  <p:clrMapOvr>
-    <a:masterClrMapping/>
-  </p:clrMapOvr>
-</p:sld>
-</file>
-
 <file path=ppt/slides/slide8.xml><?xml version="1.0" encoding="utf-8"?>
 <p:sld xmlns:a="http://schemas.openxmlformats.org/drawingml/2006/main" xmlns:r="http://schemas.openxmlformats.org/officeDocument/2006/relationships" xmlns:p="http://schemas.openxmlformats.org/presentationml/2006/main">
   <p:cSld>
@@ -7628,7 +8554,7 @@
           <p:cNvPr id="2" name="Title 1">
             <a:extLst>
               <a:ext uri="{FF2B5EF4-FFF2-40B4-BE49-F238E27FC236}">
-                <a16:creationId xmlns:a16="http://schemas.microsoft.com/office/drawing/2014/main" id="{E2E20083-BC78-4420-918C-0BF7259119F1}"/>
+                <a16:creationId xmlns:a16="http://schemas.microsoft.com/office/drawing/2014/main" id="{4FB266C6-FF38-4ABD-BF93-C7DC512DDF68}"/>
               </a:ext>
             </a:extLst>
           </p:cNvPr>
@@ -7646,7 +8572,7 @@
           <a:p>
             <a:r>
               <a:rPr lang="en-US" dirty="0"/>
-              <a:t>Wave initiation</a:t>
+              <a:t>Wave detection and labeling</a:t>
             </a:r>
           </a:p>
         </p:txBody>
@@ -7656,7 +8582,7 @@
           <p:cNvPr id="3" name="Content Placeholder 2">
             <a:extLst>
               <a:ext uri="{FF2B5EF4-FFF2-40B4-BE49-F238E27FC236}">
-                <a16:creationId xmlns:a16="http://schemas.microsoft.com/office/drawing/2014/main" id="{0FB1FCAC-8B41-40DB-972C-25654FFD05DA}"/>
+                <a16:creationId xmlns:a16="http://schemas.microsoft.com/office/drawing/2014/main" id="{A3D41532-6034-4CEF-8FE3-EEF2BE7B2DB2}"/>
               </a:ext>
             </a:extLst>
           </p:cNvPr>
@@ -7667,19 +8593,248 @@
             <p:ph idx="1"/>
           </p:nvPr>
         </p:nvSpPr>
-        <p:spPr/>
-        <p:txBody>
-          <a:bodyPr/>
-          <a:lstStyle/>
-          <a:p>
-            <a:endParaRPr lang="en-US"/>
+        <p:spPr>
+          <a:xfrm>
+            <a:off x="838200" y="1825625"/>
+            <a:ext cx="10515600" cy="871393"/>
+          </a:xfrm>
+        </p:spPr>
+        <p:txBody>
+          <a:bodyPr>
+            <a:normAutofit fontScale="77500" lnSpcReduction="20000"/>
+          </a:bodyPr>
+          <a:lstStyle/>
+          <a:p>
+            <a:r>
+              <a:rPr lang="en-US" dirty="0"/>
+              <a:t>Need to determine wave properties, requires detection and labeling</a:t>
+            </a:r>
+          </a:p>
+          <a:p>
+            <a:r>
+              <a:rPr lang="en-US" dirty="0"/>
+              <a:t>Method: apply a density filter to remove background firing events, then use a plane sweep algorithm to label the waves</a:t>
+            </a:r>
+          </a:p>
+        </p:txBody>
+      </p:sp>
+      <p:pic>
+        <p:nvPicPr>
+          <p:cNvPr id="7" name="Picture 6">
+            <a:extLst>
+              <a:ext uri="{FF2B5EF4-FFF2-40B4-BE49-F238E27FC236}">
+                <a16:creationId xmlns:a16="http://schemas.microsoft.com/office/drawing/2014/main" id="{3506C698-1191-4975-AA49-5601D932B7F9}"/>
+              </a:ext>
+            </a:extLst>
+          </p:cNvPr>
+          <p:cNvPicPr>
+            <a:picLocks noChangeAspect="1"/>
+          </p:cNvPicPr>
+          <p:nvPr/>
+        </p:nvPicPr>
+        <p:blipFill>
+          <a:blip r:embed="rId2">
+            <a:extLst>
+              <a:ext uri="{28A0092B-C50C-407E-A947-70E740481C1C}">
+                <a14:useLocalDpi xmlns:a14="http://schemas.microsoft.com/office/drawing/2010/main" val="0"/>
+              </a:ext>
+            </a:extLst>
+          </a:blip>
+          <a:stretch>
+            <a:fillRect/>
+          </a:stretch>
+        </p:blipFill>
+        <p:spPr>
+          <a:xfrm>
+            <a:off x="4081896" y="3148323"/>
+            <a:ext cx="4028208" cy="3021156"/>
+          </a:xfrm>
+          <a:prstGeom prst="rect">
+            <a:avLst/>
+          </a:prstGeom>
+        </p:spPr>
+      </p:pic>
+      <p:pic>
+        <p:nvPicPr>
+          <p:cNvPr id="9" name="Picture 8">
+            <a:extLst>
+              <a:ext uri="{FF2B5EF4-FFF2-40B4-BE49-F238E27FC236}">
+                <a16:creationId xmlns:a16="http://schemas.microsoft.com/office/drawing/2014/main" id="{1DC03AEE-6B6C-4599-8547-9EAF1414A378}"/>
+              </a:ext>
+            </a:extLst>
+          </p:cNvPr>
+          <p:cNvPicPr>
+            <a:picLocks noChangeAspect="1"/>
+          </p:cNvPicPr>
+          <p:nvPr/>
+        </p:nvPicPr>
+        <p:blipFill>
+          <a:blip r:embed="rId3">
+            <a:extLst>
+              <a:ext uri="{28A0092B-C50C-407E-A947-70E740481C1C}">
+                <a14:useLocalDpi xmlns:a14="http://schemas.microsoft.com/office/drawing/2010/main" val="0"/>
+              </a:ext>
+            </a:extLst>
+          </a:blip>
+          <a:stretch>
+            <a:fillRect/>
+          </a:stretch>
+        </p:blipFill>
+        <p:spPr>
+          <a:xfrm>
+            <a:off x="382397" y="3155807"/>
+            <a:ext cx="4028208" cy="3021156"/>
+          </a:xfrm>
+          <a:prstGeom prst="rect">
+            <a:avLst/>
+          </a:prstGeom>
+        </p:spPr>
+      </p:pic>
+      <p:pic>
+        <p:nvPicPr>
+          <p:cNvPr id="11" name="Picture 10">
+            <a:extLst>
+              <a:ext uri="{FF2B5EF4-FFF2-40B4-BE49-F238E27FC236}">
+                <a16:creationId xmlns:a16="http://schemas.microsoft.com/office/drawing/2014/main" id="{FE4E9FB2-3656-46DC-9F77-64CA6E178E79}"/>
+              </a:ext>
+            </a:extLst>
+          </p:cNvPr>
+          <p:cNvPicPr>
+            <a:picLocks noChangeAspect="1"/>
+          </p:cNvPicPr>
+          <p:nvPr/>
+        </p:nvPicPr>
+        <p:blipFill>
+          <a:blip r:embed="rId4">
+            <a:extLst>
+              <a:ext uri="{28A0092B-C50C-407E-A947-70E740481C1C}">
+                <a14:useLocalDpi xmlns:a14="http://schemas.microsoft.com/office/drawing/2010/main" val="0"/>
+              </a:ext>
+            </a:extLst>
+          </a:blip>
+          <a:stretch>
+            <a:fillRect/>
+          </a:stretch>
+        </p:blipFill>
+        <p:spPr>
+          <a:xfrm>
+            <a:off x="7998113" y="3155807"/>
+            <a:ext cx="4028208" cy="3021156"/>
+          </a:xfrm>
+          <a:prstGeom prst="rect">
+            <a:avLst/>
+          </a:prstGeom>
+        </p:spPr>
+      </p:pic>
+      <p:sp>
+        <p:nvSpPr>
+          <p:cNvPr id="12" name="TextBox 11">
+            <a:extLst>
+              <a:ext uri="{FF2B5EF4-FFF2-40B4-BE49-F238E27FC236}">
+                <a16:creationId xmlns:a16="http://schemas.microsoft.com/office/drawing/2014/main" id="{42C5ECCC-A615-4616-AC27-728D85AA3D32}"/>
+              </a:ext>
+            </a:extLst>
+          </p:cNvPr>
+          <p:cNvSpPr txBox="1"/>
+          <p:nvPr/>
+        </p:nvSpPr>
+        <p:spPr>
+          <a:xfrm>
+            <a:off x="1333760" y="2963657"/>
+            <a:ext cx="1796774" cy="369332"/>
+          </a:xfrm>
+          <a:prstGeom prst="rect">
+            <a:avLst/>
+          </a:prstGeom>
+          <a:noFill/>
+        </p:spPr>
+        <p:txBody>
+          <a:bodyPr wrap="none" rtlCol="0">
+            <a:spAutoFit/>
+          </a:bodyPr>
+          <a:lstStyle/>
+          <a:p>
+            <a:r>
+              <a:rPr lang="en-US" i="1" dirty="0"/>
+              <a:t>Raw firing events</a:t>
+            </a:r>
+          </a:p>
+        </p:txBody>
+      </p:sp>
+      <p:sp>
+        <p:nvSpPr>
+          <p:cNvPr id="13" name="TextBox 12">
+            <a:extLst>
+              <a:ext uri="{FF2B5EF4-FFF2-40B4-BE49-F238E27FC236}">
+                <a16:creationId xmlns:a16="http://schemas.microsoft.com/office/drawing/2014/main" id="{0B4FAF95-F832-41D3-816D-95E067807461}"/>
+              </a:ext>
+            </a:extLst>
+          </p:cNvPr>
+          <p:cNvSpPr txBox="1"/>
+          <p:nvPr/>
+        </p:nvSpPr>
+        <p:spPr>
+          <a:xfrm>
+            <a:off x="5518562" y="2962441"/>
+            <a:ext cx="1371594" cy="369332"/>
+          </a:xfrm>
+          <a:prstGeom prst="rect">
+            <a:avLst/>
+          </a:prstGeom>
+          <a:noFill/>
+        </p:spPr>
+        <p:txBody>
+          <a:bodyPr wrap="none" rtlCol="0">
+            <a:spAutoFit/>
+          </a:bodyPr>
+          <a:lstStyle/>
+          <a:p>
+            <a:r>
+              <a:rPr lang="en-US" i="1" dirty="0"/>
+              <a:t>Density filter</a:t>
+            </a:r>
+          </a:p>
+        </p:txBody>
+      </p:sp>
+      <p:sp>
+        <p:nvSpPr>
+          <p:cNvPr id="14" name="TextBox 13">
+            <a:extLst>
+              <a:ext uri="{FF2B5EF4-FFF2-40B4-BE49-F238E27FC236}">
+                <a16:creationId xmlns:a16="http://schemas.microsoft.com/office/drawing/2014/main" id="{73308B3D-9FB5-4555-8DC0-FDDDE576E9AF}"/>
+              </a:ext>
+            </a:extLst>
+          </p:cNvPr>
+          <p:cNvSpPr txBox="1"/>
+          <p:nvPr/>
+        </p:nvSpPr>
+        <p:spPr>
+          <a:xfrm>
+            <a:off x="9326420" y="2962441"/>
+            <a:ext cx="1552028" cy="369332"/>
+          </a:xfrm>
+          <a:prstGeom prst="rect">
+            <a:avLst/>
+          </a:prstGeom>
+          <a:noFill/>
+        </p:spPr>
+        <p:txBody>
+          <a:bodyPr wrap="none" rtlCol="0">
+            <a:spAutoFit/>
+          </a:bodyPr>
+          <a:lstStyle/>
+          <a:p>
+            <a:r>
+              <a:rPr lang="en-US" i="1" dirty="0"/>
+              <a:t>Labeled waves</a:t>
+            </a:r>
           </a:p>
         </p:txBody>
       </p:sp>
     </p:spTree>
     <p:extLst>
       <p:ext uri="{BB962C8B-B14F-4D97-AF65-F5344CB8AC3E}">
-        <p14:creationId xmlns:p14="http://schemas.microsoft.com/office/powerpoint/2010/main" val="723811812"/>
+        <p14:creationId xmlns:p14="http://schemas.microsoft.com/office/powerpoint/2010/main" val="1216758892"/>
       </p:ext>
     </p:extLst>
   </p:cSld>
@@ -7711,7 +8866,7 @@
           <p:cNvPr id="2" name="Title 1">
             <a:extLst>
               <a:ext uri="{FF2B5EF4-FFF2-40B4-BE49-F238E27FC236}">
-                <a16:creationId xmlns:a16="http://schemas.microsoft.com/office/drawing/2014/main" id="{8AE2955F-F56C-49B2-9785-47D3209298E4}"/>
+                <a16:creationId xmlns:a16="http://schemas.microsoft.com/office/drawing/2014/main" id="{E2E20083-BC78-4420-918C-0BF7259119F1}"/>
               </a:ext>
             </a:extLst>
           </p:cNvPr>
@@ -7729,7 +8884,7 @@
           <a:p>
             <a:r>
               <a:rPr lang="en-US" dirty="0"/>
-              <a:t>Wave velocity</a:t>
+              <a:t>Wave initiation</a:t>
             </a:r>
           </a:p>
         </p:txBody>
@@ -7739,7 +8894,7 @@
           <p:cNvPr id="3" name="Content Placeholder 2">
             <a:extLst>
               <a:ext uri="{FF2B5EF4-FFF2-40B4-BE49-F238E27FC236}">
-                <a16:creationId xmlns:a16="http://schemas.microsoft.com/office/drawing/2014/main" id="{2A246976-1400-4DAC-8F32-33BCE78E0F4B}"/>
+                <a16:creationId xmlns:a16="http://schemas.microsoft.com/office/drawing/2014/main" id="{0FB1FCAC-8B41-40DB-972C-25654FFD05DA}"/>
               </a:ext>
             </a:extLst>
           </p:cNvPr>
@@ -7753,35 +8908,40 @@
         <p:spPr>
           <a:xfrm>
             <a:off x="838200" y="1825625"/>
-            <a:ext cx="5765800" cy="4351338"/>
-          </a:xfrm>
-        </p:spPr>
-        <p:txBody>
-          <a:bodyPr/>
+            <a:ext cx="10515600" cy="1603375"/>
+          </a:xfrm>
+        </p:spPr>
+        <p:txBody>
+          <a:bodyPr>
+            <a:normAutofit fontScale="92500" lnSpcReduction="20000"/>
+          </a:bodyPr>
           <a:lstStyle/>
           <a:p>
             <a:r>
               <a:rPr lang="en-US" dirty="0"/>
-              <a:t>Wave speed depends on action potential delay, but it’s not linear</a:t>
+              <a:t>We observe that a given column has preferential sites for wave initiation</a:t>
             </a:r>
           </a:p>
           <a:p>
             <a:r>
               <a:rPr lang="en-US" dirty="0"/>
-              <a:t>Thicker columns support faster waves</a:t>
-            </a:r>
-          </a:p>
-          <a:p>
-            <a:endParaRPr lang="en-US" dirty="0"/>
+              <a:t>We also observe that a single propagating wave has a “density” that varies along the column</a:t>
+            </a:r>
+          </a:p>
+          <a:p>
+            <a:r>
+              <a:rPr lang="en-US" dirty="0"/>
+              <a:t>These two features are typically anti-correlated. Over 100 simulations, mean correlation coefficient was -0.28 with a standard deviation of 0.20.</a:t>
+            </a:r>
           </a:p>
         </p:txBody>
       </p:sp>
       <p:pic>
         <p:nvPicPr>
-          <p:cNvPr id="5" name="Picture 4">
-            <a:extLst>
-              <a:ext uri="{FF2B5EF4-FFF2-40B4-BE49-F238E27FC236}">
-                <a16:creationId xmlns:a16="http://schemas.microsoft.com/office/drawing/2014/main" id="{E080B59D-63DD-48F1-90E5-8CC5B54A01C3}"/>
+          <p:cNvPr id="4" name="Picture 3">
+            <a:extLst>
+              <a:ext uri="{FF2B5EF4-FFF2-40B4-BE49-F238E27FC236}">
+                <a16:creationId xmlns:a16="http://schemas.microsoft.com/office/drawing/2014/main" id="{006F0B49-8B7F-4EAE-B1B0-868865F746AA}"/>
               </a:ext>
             </a:extLst>
           </p:cNvPr>
@@ -7804,8 +8964,8 @@
         </p:blipFill>
         <p:spPr>
           <a:xfrm>
-            <a:off x="7140674" y="2048887"/>
-            <a:ext cx="5051326" cy="3788495"/>
+            <a:off x="3880469" y="3563937"/>
+            <a:ext cx="4592322" cy="3041966"/>
           </a:xfrm>
           <a:prstGeom prst="rect">
             <a:avLst/>
@@ -7815,7 +8975,7 @@
     </p:spTree>
     <p:extLst>
       <p:ext uri="{BB962C8B-B14F-4D97-AF65-F5344CB8AC3E}">
-        <p14:creationId xmlns:p14="http://schemas.microsoft.com/office/powerpoint/2010/main" val="3111375987"/>
+        <p14:creationId xmlns:p14="http://schemas.microsoft.com/office/powerpoint/2010/main" val="723811812"/>
       </p:ext>
     </p:extLst>
   </p:cSld>

</xml_diff>